<commit_message>
update tutorial presentation docs
</commit_message>
<xml_diff>
--- a/doc/ZHT-dev-tutorial-CS554@cs.iit.pptx
+++ b/doc/ZHT-dev-tutorial-CS554@cs.iit.pptx
@@ -5,7 +5,7 @@
     <p:sldMasterId id="2147483672" r:id="rId1"/>
   </p:sldMasterIdLst>
   <p:notesMasterIdLst>
-    <p:notesMasterId r:id="rId26"/>
+    <p:notesMasterId r:id="rId34"/>
   </p:notesMasterIdLst>
   <p:sldIdLst>
     <p:sldId id="256" r:id="rId2"/>
@@ -30,8 +30,16 @@
     <p:sldId id="323" r:id="rId21"/>
     <p:sldId id="324" r:id="rId22"/>
     <p:sldId id="325" r:id="rId23"/>
-    <p:sldId id="322" r:id="rId24"/>
-    <p:sldId id="275" r:id="rId25"/>
+    <p:sldId id="326" r:id="rId24"/>
+    <p:sldId id="327" r:id="rId25"/>
+    <p:sldId id="328" r:id="rId26"/>
+    <p:sldId id="329" r:id="rId27"/>
+    <p:sldId id="330" r:id="rId28"/>
+    <p:sldId id="331" r:id="rId29"/>
+    <p:sldId id="332" r:id="rId30"/>
+    <p:sldId id="322" r:id="rId31"/>
+    <p:sldId id="333" r:id="rId32"/>
+    <p:sldId id="275" r:id="rId33"/>
   </p:sldIdLst>
   <p:sldSz cx="9144000" cy="6858000" type="screen4x3"/>
   <p:notesSz cx="6858000" cy="9144000"/>
@@ -216,7 +224,7 @@
             <a:fld id="{5FE78FA7-BF47-4500-9FD1-4BBD979584BA}" type="datetimeFigureOut">
               <a:rPr lang="en-US" smtClean="0"/>
               <a:pPr/>
-              <a:t>10/24/2013</a:t>
+              <a:t>10/25/2013</a:t>
             </a:fld>
             <a:endParaRPr lang="en-US"/>
           </a:p>
@@ -637,7 +645,7 @@
             <a:fld id="{D1598C40-E577-4FE8-9EA4-7402346C82FB}" type="slidenum">
               <a:rPr lang="en-US" smtClean="0"/>
               <a:pPr/>
-              <a:t>24</a:t>
+              <a:t>32</a:t>
             </a:fld>
             <a:endParaRPr lang="en-US"/>
           </a:p>
@@ -899,7 +907,7 @@
           <a:p>
             <a:fld id="{9686935F-031B-4F18-BB6E-C4344B5343D9}" type="datetime1">
               <a:rPr lang="en-US" smtClean="0"/>
-              <a:t>10/24/2013</a:t>
+              <a:t>10/25/2013</a:t>
             </a:fld>
             <a:endParaRPr lang="en-US"/>
           </a:p>
@@ -1123,7 +1131,7 @@
           <a:p>
             <a:fld id="{493D7889-458E-4ED3-A5F4-0C0B77FD22CF}" type="datetime1">
               <a:rPr lang="en-US" smtClean="0"/>
-              <a:t>10/24/2013</a:t>
+              <a:t>10/25/2013</a:t>
             </a:fld>
             <a:endParaRPr lang="en-US"/>
           </a:p>
@@ -1404,7 +1412,7 @@
           <a:p>
             <a:fld id="{57E85575-CB6F-4B4E-8F43-A91F162080CA}" type="datetime1">
               <a:rPr lang="en-US" smtClean="0"/>
-              <a:t>10/24/2013</a:t>
+              <a:t>10/25/2013</a:t>
             </a:fld>
             <a:endParaRPr lang="en-US"/>
           </a:p>
@@ -1606,7 +1614,7 @@
           <a:p>
             <a:fld id="{E12637B4-503E-4D93-A62B-1AA03F23B69B}" type="datetime1">
               <a:rPr lang="en-US" smtClean="0"/>
-              <a:t>10/24/2013</a:t>
+              <a:t>10/25/2013</a:t>
             </a:fld>
             <a:endParaRPr lang="en-US"/>
           </a:p>
@@ -1965,7 +1973,7 @@
           <a:p>
             <a:fld id="{AFF297B6-0094-43FC-9CA1-6EAC0698E4B7}" type="datetime1">
               <a:rPr lang="en-US" smtClean="0"/>
-              <a:t>10/24/2013</a:t>
+              <a:t>10/25/2013</a:t>
             </a:fld>
             <a:endParaRPr lang="en-US"/>
           </a:p>
@@ -2253,7 +2261,7 @@
           <a:p>
             <a:fld id="{9B98A1F1-0E03-465F-85DC-300C9BF57DE0}" type="datetime1">
               <a:rPr lang="en-US" smtClean="0"/>
-              <a:t>10/24/2013</a:t>
+              <a:t>10/25/2013</a:t>
             </a:fld>
             <a:endParaRPr lang="en-US"/>
           </a:p>
@@ -2676,7 +2684,7 @@
           <a:p>
             <a:fld id="{1DA85D97-4C4E-42FD-868C-BA88FA07364C}" type="datetime1">
               <a:rPr lang="en-US" smtClean="0"/>
-              <a:t>10/24/2013</a:t>
+              <a:t>10/25/2013</a:t>
             </a:fld>
             <a:endParaRPr lang="en-US"/>
           </a:p>
@@ -2792,7 +2800,7 @@
           <a:p>
             <a:fld id="{450D9ECD-28E7-4D15-AA29-BD142AEB7E81}" type="datetime1">
               <a:rPr lang="en-US" smtClean="0"/>
-              <a:t>10/24/2013</a:t>
+              <a:t>10/25/2013</a:t>
             </a:fld>
             <a:endParaRPr lang="en-US"/>
           </a:p>
@@ -2883,7 +2891,7 @@
           <a:p>
             <a:fld id="{AF7AE9ED-8AB4-40F1-B53C-2792FFBD46DB}" type="datetime1">
               <a:rPr lang="en-US" smtClean="0"/>
-              <a:t>10/24/2013</a:t>
+              <a:t>10/25/2013</a:t>
             </a:fld>
             <a:endParaRPr lang="en-US"/>
           </a:p>
@@ -3162,7 +3170,7 @@
           <a:p>
             <a:fld id="{9ABA7DBC-B4B1-4890-B7EE-0E2F84FF8A1A}" type="datetime1">
               <a:rPr lang="en-US" smtClean="0"/>
-              <a:t>10/24/2013</a:t>
+              <a:t>10/25/2013</a:t>
             </a:fld>
             <a:endParaRPr lang="en-US"/>
           </a:p>
@@ -3529,7 +3537,7 @@
           <a:p>
             <a:fld id="{57143B8C-5149-4F92-826A-3AA7EE85FC70}" type="datetime1">
               <a:rPr lang="en-US" smtClean="0"/>
-              <a:t>10/24/2013</a:t>
+              <a:t>10/25/2013</a:t>
             </a:fld>
             <a:endParaRPr lang="en-US"/>
           </a:p>
@@ -3967,7 +3975,7 @@
           <a:p>
             <a:fld id="{C897382C-2278-4C8B-B521-0F1DB96C3ACB}" type="datetime1">
               <a:rPr lang="en-US" smtClean="0"/>
-              <a:t>10/24/2013</a:t>
+              <a:t>10/25/2013</a:t>
             </a:fld>
             <a:endParaRPr lang="en-US"/>
           </a:p>
@@ -5124,11 +5132,7 @@
             </a:r>
             <a:r>
               <a:rPr lang="en-US" sz="4400" dirty="0" smtClean="0"/>
-              <a:t> your ZHT </a:t>
-            </a:r>
-            <a:r>
-              <a:rPr lang="en-US" sz="4400" dirty="0" smtClean="0"/>
-              <a:t>apps - walkthrough</a:t>
+              <a:t> your ZHT apps - walkthrough</a:t>
             </a:r>
             <a:endParaRPr lang="en-US" sz="4000" dirty="0"/>
           </a:p>
@@ -5318,11 +5322,7 @@
             </a:pPr>
             <a:r>
               <a:rPr lang="en-US" dirty="0" smtClean="0"/>
-              <a:t>cd </a:t>
-            </a:r>
-            <a:r>
-              <a:rPr lang="en-US" dirty="0" smtClean="0"/>
-              <a:t>to </a:t>
+              <a:t>cd to </a:t>
             </a:r>
             <a:r>
               <a:rPr lang="en-US" dirty="0" err="1" smtClean="0"/>
@@ -5442,11 +5442,7 @@
             </a:r>
             <a:r>
               <a:rPr lang="en-US" sz="4400" dirty="0" smtClean="0"/>
-              <a:t> your ZHT </a:t>
-            </a:r>
-            <a:r>
-              <a:rPr lang="en-US" sz="4400" dirty="0" smtClean="0"/>
-              <a:t>apps - walkthrough</a:t>
+              <a:t> your ZHT apps - walkthrough</a:t>
             </a:r>
             <a:endParaRPr lang="en-US" sz="4000" dirty="0"/>
           </a:p>
@@ -5550,11 +5546,7 @@
             </a:r>
             <a:r>
               <a:rPr lang="en-US" dirty="0" smtClean="0"/>
-              <a:t> </a:t>
-            </a:r>
-            <a:r>
-              <a:rPr lang="en-US" dirty="0" smtClean="0"/>
-              <a:t>lib </a:t>
+              <a:t> lib </a:t>
             </a:r>
             <a:r>
               <a:rPr lang="en-US" dirty="0" smtClean="0">
@@ -5588,11 +5580,6 @@
               </a:rPr>
               <a:t>ZHT lib file your app needs to link to</a:t>
             </a:r>
-            <a:endParaRPr lang="en-US" dirty="0" smtClean="0">
-              <a:solidFill>
-                <a:srgbClr val="0070C0"/>
-              </a:solidFill>
-            </a:endParaRPr>
           </a:p>
           <a:p>
             <a:pPr marL="438912" lvl="1" indent="-320040">
@@ -5973,11 +5960,7 @@
             </a:r>
             <a:r>
               <a:rPr lang="en-US" sz="4400" dirty="0" smtClean="0"/>
-              <a:t> your ZHT </a:t>
-            </a:r>
-            <a:r>
-              <a:rPr lang="en-US" sz="4400" dirty="0" smtClean="0"/>
-              <a:t>apps - walkthrough</a:t>
+              <a:t> your ZHT apps - walkthrough</a:t>
             </a:r>
             <a:endParaRPr lang="en-US" sz="4000" dirty="0"/>
           </a:p>
@@ -6035,11 +6018,7 @@
             </a:r>
             <a:r>
               <a:rPr lang="en-US" dirty="0" smtClean="0"/>
-              <a:t>ash </a:t>
-            </a:r>
-            <a:r>
-              <a:rPr lang="en-US" dirty="0" smtClean="0"/>
-              <a:t>comp.sh </a:t>
+              <a:t>ash comp.sh </a:t>
             </a:r>
             <a:r>
               <a:rPr lang="en-US" dirty="0" smtClean="0">
@@ -6254,11 +6233,7 @@
             </a:r>
             <a:r>
               <a:rPr lang="en-US" sz="4400" dirty="0" smtClean="0"/>
-              <a:t> your ZHT </a:t>
-            </a:r>
-            <a:r>
-              <a:rPr lang="en-US" sz="4400" dirty="0" smtClean="0"/>
-              <a:t>apps – </a:t>
+              <a:t> your ZHT apps – </a:t>
             </a:r>
             <a:br>
               <a:rPr lang="en-US" sz="4400" dirty="0" smtClean="0"/>
@@ -6642,11 +6617,7 @@
             </a:r>
             <a:r>
               <a:rPr lang="en-US" sz="4400" dirty="0" smtClean="0"/>
-              <a:t> your ZHT </a:t>
-            </a:r>
-            <a:r>
-              <a:rPr lang="en-US" sz="4400" dirty="0" smtClean="0"/>
-              <a:t>apps – </a:t>
+              <a:t> your ZHT apps – </a:t>
             </a:r>
             <a:br>
               <a:rPr lang="en-US" sz="4400" dirty="0" smtClean="0"/>
@@ -7081,11 +7052,7 @@
             </a:r>
             <a:r>
               <a:rPr lang="en-US" sz="4400" dirty="0" smtClean="0"/>
-              <a:t> your ZHT </a:t>
-            </a:r>
-            <a:r>
-              <a:rPr lang="en-US" sz="4400" dirty="0" smtClean="0"/>
-              <a:t>apps – </a:t>
+              <a:t> your ZHT apps – </a:t>
             </a:r>
             <a:br>
               <a:rPr lang="en-US" sz="4400" dirty="0" smtClean="0"/>
@@ -7356,11 +7323,7 @@
             </a:r>
             <a:r>
               <a:rPr lang="en-US" sz="4400" dirty="0" smtClean="0"/>
-              <a:t> your ZHT </a:t>
-            </a:r>
-            <a:r>
-              <a:rPr lang="en-US" sz="4400" dirty="0" smtClean="0"/>
-              <a:t>apps – </a:t>
+              <a:t> your ZHT apps – </a:t>
             </a:r>
             <a:br>
               <a:rPr lang="en-US" sz="4400" dirty="0" smtClean="0"/>
@@ -7752,11 +7715,7 @@
             </a:r>
             <a:r>
               <a:rPr lang="en-US" sz="4400" dirty="0" smtClean="0"/>
-              <a:t> your ZHT </a:t>
-            </a:r>
-            <a:r>
-              <a:rPr lang="en-US" sz="4400" dirty="0" smtClean="0"/>
-              <a:t>apps – </a:t>
+              <a:t> your ZHT apps – </a:t>
             </a:r>
             <a:br>
               <a:rPr lang="en-US" sz="4400" dirty="0" smtClean="0"/>
@@ -8088,11 +8047,7 @@
           <a:p>
             <a:r>
               <a:rPr lang="en-US" sz="4400" dirty="0" smtClean="0"/>
-              <a:t>How </a:t>
-            </a:r>
-            <a:r>
-              <a:rPr lang="en-US" sz="4400" dirty="0" smtClean="0"/>
-              <a:t>to customize ZHT-</a:t>
+              <a:t>How to customize ZHT-</a:t>
             </a:r>
             <a:br>
               <a:rPr lang="en-US" sz="4400" dirty="0" smtClean="0"/>
@@ -8360,23 +8315,7 @@
             </a:r>
             <a:r>
               <a:rPr lang="en-US" dirty="0"/>
-              <a:t> </a:t>
-            </a:r>
-            <a:r>
-              <a:rPr lang="en-US" dirty="0"/>
-              <a:t>char</a:t>
-            </a:r>
-            <a:r>
-              <a:rPr lang="en-US" dirty="0"/>
-              <a:t> *key, </a:t>
-            </a:r>
-            <a:r>
-              <a:rPr lang="en-US" dirty="0"/>
-              <a:t>char</a:t>
-            </a:r>
-            <a:r>
-              <a:rPr lang="en-US" dirty="0"/>
-              <a:t> *result</a:t>
+              <a:t> char *key, char *result</a:t>
             </a:r>
             <a:r>
               <a:rPr lang="en-US" dirty="0" smtClean="0"/>
@@ -8735,11 +8674,7 @@
           <a:p>
             <a:r>
               <a:rPr lang="en-US" sz="4400" dirty="0" smtClean="0"/>
-              <a:t>How </a:t>
-            </a:r>
-            <a:r>
-              <a:rPr lang="en-US" sz="4400" dirty="0" smtClean="0"/>
-              <a:t>to customize ZHT-</a:t>
+              <a:t>How to customize ZHT-</a:t>
             </a:r>
             <a:br>
               <a:rPr lang="en-US" sz="4400" dirty="0" smtClean="0"/>
@@ -8931,11 +8866,7 @@
           <a:p>
             <a:r>
               <a:rPr lang="en-US" sz="4400" dirty="0" smtClean="0"/>
-              <a:t>How </a:t>
-            </a:r>
-            <a:r>
-              <a:rPr lang="en-US" sz="4400" dirty="0" smtClean="0"/>
-              <a:t>to customize ZHT-</a:t>
+              <a:t>How to customize ZHT-</a:t>
             </a:r>
             <a:br>
               <a:rPr lang="en-US" sz="4400" dirty="0" smtClean="0"/>
@@ -9095,15 +9026,7 @@
             </a:r>
             <a:r>
               <a:rPr lang="en-US" dirty="0"/>
-              <a:t> </a:t>
-            </a:r>
-            <a:r>
-              <a:rPr lang="en-US" dirty="0"/>
-              <a:t>char</a:t>
-            </a:r>
-            <a:r>
-              <a:rPr lang="en-US" dirty="0"/>
-              <a:t> *</a:t>
+              <a:t> char *</a:t>
             </a:r>
             <a:r>
               <a:rPr lang="en-US" dirty="0" err="1"/>
@@ -9232,7 +9155,6 @@
               <a:rPr lang="en-US" dirty="0"/>
               <a:t>)</a:t>
             </a:r>
-            <a:endParaRPr lang="en-US" dirty="0"/>
           </a:p>
           <a:p>
             <a:pPr lvl="1"/>
@@ -9309,11 +9231,26 @@
             </a:r>
             <a:r>
               <a:rPr lang="en-US" sz="4400" dirty="0" smtClean="0"/>
-              <a:t> your ZHT </a:t>
-            </a:r>
-            <a:r>
+              <a:t> your ZHT apps-</a:t>
+            </a:r>
+            <a:br>
               <a:rPr lang="en-US" sz="4400" dirty="0" smtClean="0"/>
-              <a:t>apps</a:t>
+            </a:br>
+            <a:r>
+              <a:rPr lang="en-US" sz="3600" dirty="0">
+                <a:solidFill>
+                  <a:srgbClr val="F0AD00"/>
+                </a:solidFill>
+              </a:rPr>
+              <a:t>thread </a:t>
+            </a:r>
+            <a:r>
+              <a:rPr lang="en-US" sz="3600" dirty="0" smtClean="0">
+                <a:solidFill>
+                  <a:srgbClr val="F0AD00"/>
+                </a:solidFill>
+              </a:rPr>
+              <a:t>safe</a:t>
             </a:r>
             <a:endParaRPr lang="en-US" sz="3600" dirty="0"/>
           </a:p>
@@ -9365,21 +9302,104 @@
           </a:bodyPr>
           <a:lstStyle/>
           <a:p>
-            <a:pPr marL="438912" lvl="1" indent="-320040">
-              <a:spcBef>
-                <a:spcPts val="0"/>
-              </a:spcBef>
-              <a:buClr>
-                <a:schemeClr val="accent1"/>
-              </a:buClr>
-              <a:buSzPct val="80000"/>
-              <a:buFont typeface="Wingdings 2"/>
+            <a:pPr>
+              <a:buFont typeface="Wingdings 2" charset="2"/>
               <a:buChar char=""/>
             </a:pPr>
             <a:r>
               <a:rPr lang="en-US" dirty="0" smtClean="0"/>
-              <a:t>demo</a:t>
-            </a:r>
+              <a:t>ZHT </a:t>
+            </a:r>
+            <a:r>
+              <a:rPr lang="en-US" dirty="0"/>
+              <a:t>client thread safe</a:t>
+            </a:r>
+          </a:p>
+          <a:p>
+            <a:pPr lvl="1">
+              <a:buSzPct val="75000"/>
+              <a:buFont typeface="StarSymbol"/>
+              <a:buChar char=""/>
+            </a:pPr>
+            <a:r>
+              <a:rPr lang="en-US" dirty="0">
+                <a:solidFill>
+                  <a:srgbClr val="000000"/>
+                </a:solidFill>
+              </a:rPr>
+              <a:t>ZHT client API is thread-safe at operation level</a:t>
+            </a:r>
+            <a:endParaRPr lang="en-US" dirty="0"/>
+          </a:p>
+          <a:p>
+            <a:pPr lvl="1">
+              <a:buSzPct val="75000"/>
+              <a:buFont typeface="StarSymbol"/>
+              <a:buChar char=""/>
+            </a:pPr>
+            <a:r>
+              <a:rPr lang="en-US" dirty="0">
+                <a:solidFill>
+                  <a:srgbClr val="000000"/>
+                </a:solidFill>
+              </a:rPr>
+              <a:t>ZHT client API is thread-safe at socket level</a:t>
+            </a:r>
+            <a:endParaRPr lang="en-US" dirty="0"/>
+          </a:p>
+          <a:p>
+            <a:pPr lvl="1">
+              <a:buSzPct val="75000"/>
+              <a:buFont typeface="StarSymbol"/>
+              <a:buChar char=""/>
+            </a:pPr>
+            <a:r>
+              <a:rPr lang="en-US" dirty="0">
+                <a:solidFill>
+                  <a:srgbClr val="000000"/>
+                </a:solidFill>
+              </a:rPr>
+              <a:t>We will explore making it thread safe at MPI rank </a:t>
+            </a:r>
+            <a:r>
+              <a:rPr lang="en-US" dirty="0" smtClean="0">
+                <a:solidFill>
+                  <a:srgbClr val="000000"/>
+                </a:solidFill>
+              </a:rPr>
+              <a:t>level</a:t>
+            </a:r>
+            <a:endParaRPr lang="en-US" dirty="0"/>
+          </a:p>
+          <a:p>
+            <a:pPr>
+              <a:buSzPct val="75000"/>
+            </a:pPr>
+            <a:r>
+              <a:rPr lang="en-US" sz="3200" dirty="0" smtClean="0">
+                <a:solidFill>
+                  <a:srgbClr val="000000"/>
+                </a:solidFill>
+              </a:rPr>
+              <a:t>ZHT server is </a:t>
+            </a:r>
+            <a:r>
+              <a:rPr lang="en-US" sz="3200" dirty="0">
+                <a:solidFill>
+                  <a:srgbClr val="000000"/>
+                </a:solidFill>
+              </a:rPr>
+              <a:t>thread </a:t>
+            </a:r>
+            <a:r>
+              <a:rPr lang="en-US" sz="3200" dirty="0" smtClean="0">
+                <a:solidFill>
+                  <a:srgbClr val="000000"/>
+                </a:solidFill>
+              </a:rPr>
+              <a:t>safe</a:t>
+            </a:r>
+            <a:endParaRPr lang="en-US" dirty="0" smtClean="0"/>
           </a:p>
           <a:p>
             <a:pPr lvl="2"/>
@@ -9394,7 +9414,7 @@
     </p:spTree>
     <p:extLst>
       <p:ext uri="{BB962C8B-B14F-4D97-AF65-F5344CB8AC3E}">
-        <p14:creationId xmlns:p14="http://schemas.microsoft.com/office/powerpoint/2010/main" val="1200828179"/>
+        <p14:creationId xmlns:p14="http://schemas.microsoft.com/office/powerpoint/2010/main" val="3261243815"/>
       </p:ext>
     </p:extLst>
   </p:cSld>
@@ -9438,82 +9458,42 @@
             <p:ph type="title"/>
           </p:nvPr>
         </p:nvSpPr>
-        <p:spPr/>
-        <p:txBody>
-          <a:bodyPr/>
-          <a:lstStyle/>
-          <a:p>
-            <a:endParaRPr lang="en-US" dirty="0"/>
-          </a:p>
-        </p:txBody>
-      </p:sp>
-      <p:sp>
-        <p:nvSpPr>
-          <p:cNvPr id="3" name="Content Placeholder 2"/>
-          <p:cNvSpPr>
-            <a:spLocks noGrp="1"/>
-          </p:cNvSpPr>
-          <p:nvPr>
-            <p:ph idx="1"/>
-          </p:nvPr>
-        </p:nvSpPr>
-        <p:spPr/>
+        <p:spPr>
+          <a:xfrm>
+            <a:off x="0" y="155448"/>
+            <a:ext cx="9144000" cy="1252728"/>
+          </a:xfrm>
+        </p:spPr>
         <p:txBody>
           <a:bodyPr>
-            <a:normAutofit/>
+            <a:noAutofit/>
           </a:bodyPr>
           <a:lstStyle/>
           <a:p>
-            <a:pPr algn="ctr">
-              <a:buNone/>
-            </a:pPr>
-            <a:endParaRPr lang="en-US" sz="8800" dirty="0" smtClean="0"/>
-          </a:p>
-          <a:p>
-            <a:pPr algn="ctr">
-              <a:buNone/>
-            </a:pPr>
-            <a:r>
-              <a:rPr lang="en-US" sz="8800" b="1" dirty="0" smtClean="0"/>
-              <a:t>Questions?</a:t>
-            </a:r>
-          </a:p>
-          <a:p>
-            <a:pPr algn="ctr">
-              <a:buNone/>
-            </a:pPr>
-            <a:r>
-              <a:rPr lang="en-US" sz="2000" b="1" dirty="0" err="1" smtClean="0"/>
-              <a:t>Tonglin</a:t>
-            </a:r>
-            <a:r>
-              <a:rPr lang="en-US" sz="2000" b="1" dirty="0" smtClean="0"/>
-              <a:t> Li</a:t>
-            </a:r>
-          </a:p>
-          <a:p>
-            <a:pPr algn="ctr">
-              <a:buNone/>
-            </a:pPr>
-            <a:r>
-              <a:rPr lang="en-US" sz="2000" b="1" dirty="0" smtClean="0">
-                <a:hlinkClick r:id="rId3"/>
-              </a:rPr>
-              <a:t>tli13@hawk.iit.edu</a:t>
-            </a:r>
-            <a:endParaRPr lang="en-US" sz="2000" b="1" dirty="0" smtClean="0"/>
-          </a:p>
-          <a:p>
-            <a:pPr algn="ctr">
-              <a:buNone/>
-            </a:pPr>
-            <a:r>
-              <a:rPr lang="en-US" sz="2000" dirty="0">
-                <a:hlinkClick r:id="rId4"/>
-              </a:rPr>
-              <a:t>http://datasys.cs.iit.edu/projects/ZHT/</a:t>
-            </a:r>
-            <a:endParaRPr lang="en-US" sz="2000" b="1" dirty="0"/>
+            <a:r>
+              <a:rPr lang="en-US" sz="4400" dirty="0" smtClean="0"/>
+              <a:t>How to </a:t>
+            </a:r>
+            <a:r>
+              <a:rPr lang="en-US" sz="4400" dirty="0" err="1" smtClean="0"/>
+              <a:t>dev</a:t>
+            </a:r>
+            <a:r>
+              <a:rPr lang="en-US" sz="4400" dirty="0" smtClean="0"/>
+              <a:t> your ZHT apps-</a:t>
+            </a:r>
+            <a:br>
+              <a:rPr lang="en-US" sz="4400" dirty="0" smtClean="0"/>
+            </a:br>
+            <a:r>
+              <a:rPr lang="en-US" sz="3600" dirty="0" err="1">
+                <a:solidFill>
+                  <a:srgbClr val="F0AD00"/>
+                </a:solidFill>
+              </a:rPr>
+              <a:t>configration</a:t>
+            </a:r>
+            <a:endParaRPr lang="en-US" sz="3600" dirty="0"/>
           </a:p>
         </p:txBody>
       </p:sp>
@@ -9541,7 +9521,1963 @@
           </a:p>
         </p:txBody>
       </p:sp>
+      <p:sp>
+        <p:nvSpPr>
+          <p:cNvPr id="3" name="Content Placeholder 2"/>
+          <p:cNvSpPr>
+            <a:spLocks noGrp="1"/>
+          </p:cNvSpPr>
+          <p:nvPr>
+            <p:ph idx="1"/>
+          </p:nvPr>
+        </p:nvSpPr>
+        <p:spPr>
+          <a:xfrm>
+            <a:off x="304800" y="1775191"/>
+            <a:ext cx="8229600" cy="4625609"/>
+          </a:xfrm>
+        </p:spPr>
+        <p:txBody>
+          <a:bodyPr>
+            <a:normAutofit fontScale="92500" lnSpcReduction="10000"/>
+          </a:bodyPr>
+          <a:lstStyle/>
+          <a:p>
+            <a:pPr>
+              <a:buFont typeface="Wingdings 2" charset="2"/>
+              <a:buChar char=""/>
+            </a:pPr>
+            <a:r>
+              <a:rPr lang="en-US" dirty="0" err="1" smtClean="0"/>
+              <a:t>zht.conf</a:t>
+            </a:r>
+            <a:endParaRPr lang="en-US" dirty="0" smtClean="0"/>
+          </a:p>
+          <a:p>
+            <a:pPr lvl="1">
+              <a:buFont typeface="Wingdings 2" charset="2"/>
+              <a:buChar char=""/>
+            </a:pPr>
+            <a:r>
+              <a:rPr lang="en-US" dirty="0" smtClean="0">
+                <a:solidFill>
+                  <a:srgbClr val="FF0000"/>
+                </a:solidFill>
+              </a:rPr>
+              <a:t>PROTOCOL </a:t>
+            </a:r>
+            <a:r>
+              <a:rPr lang="en-US" dirty="0">
+                <a:solidFill>
+                  <a:srgbClr val="FF0000"/>
+                </a:solidFill>
+              </a:rPr>
+              <a:t>TCP </a:t>
+            </a:r>
+            <a:r>
+              <a:rPr lang="en-US" dirty="0">
+                <a:solidFill>
+                  <a:srgbClr val="008080"/>
+                </a:solidFill>
+              </a:rPr>
+              <a:t>#communication protocol for ZHT client and </a:t>
+            </a:r>
+            <a:r>
+              <a:rPr lang="en-US" dirty="0" smtClean="0">
+                <a:solidFill>
+                  <a:srgbClr val="008080"/>
+                </a:solidFill>
+              </a:rPr>
+              <a:t>server</a:t>
+            </a:r>
+          </a:p>
+          <a:p>
+            <a:pPr lvl="1">
+              <a:buFont typeface="Wingdings 2" charset="2"/>
+              <a:buChar char=""/>
+            </a:pPr>
+            <a:r>
+              <a:rPr lang="en-US" dirty="0" smtClean="0">
+                <a:solidFill>
+                  <a:srgbClr val="FF0000"/>
+                </a:solidFill>
+              </a:rPr>
+              <a:t>PORT </a:t>
+            </a:r>
+            <a:r>
+              <a:rPr lang="en-US" dirty="0">
+                <a:solidFill>
+                  <a:srgbClr val="FF0000"/>
+                </a:solidFill>
+              </a:rPr>
+              <a:t>50000 </a:t>
+            </a:r>
+            <a:r>
+              <a:rPr lang="en-US" dirty="0">
+                <a:solidFill>
+                  <a:srgbClr val="008080"/>
+                </a:solidFill>
+              </a:rPr>
+              <a:t>#</a:t>
+            </a:r>
+            <a:r>
+              <a:rPr lang="en-US" dirty="0" err="1">
+                <a:solidFill>
+                  <a:srgbClr val="008080"/>
+                </a:solidFill>
+              </a:rPr>
+              <a:t>zhtserver</a:t>
+            </a:r>
+            <a:r>
+              <a:rPr lang="en-US" dirty="0">
+                <a:solidFill>
+                  <a:srgbClr val="008080"/>
+                </a:solidFill>
+              </a:rPr>
+              <a:t> port to listen on, overrides by -p </a:t>
+            </a:r>
+            <a:r>
+              <a:rPr lang="en-US" dirty="0" smtClean="0">
+                <a:solidFill>
+                  <a:srgbClr val="008080"/>
+                </a:solidFill>
+              </a:rPr>
+              <a:t>option</a:t>
+            </a:r>
+          </a:p>
+          <a:p>
+            <a:pPr lvl="1">
+              <a:buFont typeface="Wingdings 2" charset="2"/>
+              <a:buChar char=""/>
+            </a:pPr>
+            <a:r>
+              <a:rPr lang="en-US" dirty="0" smtClean="0">
+                <a:solidFill>
+                  <a:srgbClr val="FF0000"/>
+                </a:solidFill>
+              </a:rPr>
+              <a:t>MSG_MAXSIZE </a:t>
+            </a:r>
+            <a:r>
+              <a:rPr lang="en-US" dirty="0">
+                <a:solidFill>
+                  <a:srgbClr val="FF0000"/>
+                </a:solidFill>
+              </a:rPr>
+              <a:t>1000000</a:t>
+            </a:r>
+            <a:r>
+              <a:rPr lang="en-US" dirty="0">
+                <a:solidFill>
+                  <a:srgbClr val="008080"/>
+                </a:solidFill>
+              </a:rPr>
+              <a:t> #max size of message for a single </a:t>
+            </a:r>
+            <a:r>
+              <a:rPr lang="en-US" dirty="0" smtClean="0">
+                <a:solidFill>
+                  <a:srgbClr val="008080"/>
+                </a:solidFill>
+              </a:rPr>
+              <a:t>trip</a:t>
+            </a:r>
+          </a:p>
+          <a:p>
+            <a:pPr lvl="1">
+              <a:buFont typeface="Wingdings 2" charset="2"/>
+              <a:buChar char=""/>
+            </a:pPr>
+            <a:r>
+              <a:rPr lang="en-US" dirty="0" smtClean="0">
+                <a:solidFill>
+                  <a:srgbClr val="FF0000"/>
+                </a:solidFill>
+              </a:rPr>
+              <a:t>SCCB_POLL_INTERVAL </a:t>
+            </a:r>
+            <a:r>
+              <a:rPr lang="en-US" dirty="0">
+                <a:solidFill>
+                  <a:srgbClr val="FF0000"/>
+                </a:solidFill>
+              </a:rPr>
+              <a:t>100</a:t>
+            </a:r>
+            <a:r>
+              <a:rPr lang="en-US" dirty="0">
+                <a:solidFill>
+                  <a:srgbClr val="008080"/>
+                </a:solidFill>
+              </a:rPr>
+              <a:t> #the interval  in milliseconds to resume polling a status of a </a:t>
+            </a:r>
+            <a:r>
+              <a:rPr lang="en-US" dirty="0" smtClean="0">
+                <a:solidFill>
+                  <a:srgbClr val="008080"/>
+                </a:solidFill>
+              </a:rPr>
+              <a:t>item</a:t>
+            </a:r>
+          </a:p>
+          <a:p>
+            <a:pPr lvl="1">
+              <a:buFont typeface="Wingdings 2" charset="2"/>
+              <a:buChar char=""/>
+            </a:pPr>
+            <a:r>
+              <a:rPr lang="en-US" dirty="0" smtClean="0">
+                <a:solidFill>
+                  <a:srgbClr val="FF0000"/>
+                </a:solidFill>
+              </a:rPr>
+              <a:t>INSTANT_SWAP </a:t>
+            </a:r>
+            <a:r>
+              <a:rPr lang="en-US" dirty="0">
+                <a:solidFill>
+                  <a:srgbClr val="FF0000"/>
+                </a:solidFill>
+              </a:rPr>
+              <a:t>1</a:t>
+            </a:r>
+            <a:r>
+              <a:rPr lang="en-US" dirty="0">
+                <a:solidFill>
+                  <a:srgbClr val="008080"/>
+                </a:solidFill>
+              </a:rPr>
+              <a:t> #set if instantly swap in-memory data to disk</a:t>
+            </a:r>
+            <a:endParaRPr lang="en-US" dirty="0"/>
+          </a:p>
+          <a:p>
+            <a:pPr lvl="1">
+              <a:buFont typeface="Wingdings 2" charset="2"/>
+              <a:buChar char=""/>
+            </a:pPr>
+            <a:endParaRPr lang="en-US" dirty="0" smtClean="0"/>
+          </a:p>
+          <a:p>
+            <a:pPr lvl="2"/>
+            <a:endParaRPr lang="en-US" dirty="0"/>
+          </a:p>
+          <a:p>
+            <a:pPr lvl="1"/>
+            <a:endParaRPr lang="en-US" dirty="0"/>
+          </a:p>
+        </p:txBody>
+      </p:sp>
     </p:spTree>
+    <p:extLst>
+      <p:ext uri="{BB962C8B-B14F-4D97-AF65-F5344CB8AC3E}">
+        <p14:creationId xmlns:p14="http://schemas.microsoft.com/office/powerpoint/2010/main" val="3107475162"/>
+      </p:ext>
+    </p:extLst>
+  </p:cSld>
+  <p:clrMapOvr>
+    <a:masterClrMapping/>
+  </p:clrMapOvr>
+  <p:timing>
+    <p:tnLst>
+      <p:par>
+        <p:cTn id="1" dur="indefinite" restart="never" nodeType="tmRoot"/>
+      </p:par>
+    </p:tnLst>
+  </p:timing>
+</p:sld>
+</file>
+
+<file path=ppt/slides/slide25.xml><?xml version="1.0" encoding="utf-8"?>
+<p:sld xmlns:a="http://schemas.openxmlformats.org/drawingml/2006/main" xmlns:r="http://schemas.openxmlformats.org/officeDocument/2006/relationships" xmlns:p="http://schemas.openxmlformats.org/presentationml/2006/main">
+  <p:cSld>
+    <p:spTree>
+      <p:nvGrpSpPr>
+        <p:cNvPr id="1" name=""/>
+        <p:cNvGrpSpPr/>
+        <p:nvPr/>
+      </p:nvGrpSpPr>
+      <p:grpSpPr>
+        <a:xfrm>
+          <a:off x="0" y="0"/>
+          <a:ext cx="0" cy="0"/>
+          <a:chOff x="0" y="0"/>
+          <a:chExt cx="0" cy="0"/>
+        </a:xfrm>
+      </p:grpSpPr>
+      <p:sp>
+        <p:nvSpPr>
+          <p:cNvPr id="2" name="Title 1"/>
+          <p:cNvSpPr>
+            <a:spLocks noGrp="1"/>
+          </p:cNvSpPr>
+          <p:nvPr>
+            <p:ph type="title"/>
+          </p:nvPr>
+        </p:nvSpPr>
+        <p:spPr>
+          <a:xfrm>
+            <a:off x="0" y="155448"/>
+            <a:ext cx="9144000" cy="1252728"/>
+          </a:xfrm>
+        </p:spPr>
+        <p:txBody>
+          <a:bodyPr>
+            <a:noAutofit/>
+          </a:bodyPr>
+          <a:lstStyle/>
+          <a:p>
+            <a:r>
+              <a:rPr lang="en-US" sz="4400" dirty="0" smtClean="0"/>
+              <a:t>How to </a:t>
+            </a:r>
+            <a:r>
+              <a:rPr lang="en-US" sz="4400" dirty="0" err="1" smtClean="0"/>
+              <a:t>dev</a:t>
+            </a:r>
+            <a:r>
+              <a:rPr lang="en-US" sz="4400" dirty="0" smtClean="0"/>
+              <a:t> your ZHT apps-</a:t>
+            </a:r>
+            <a:br>
+              <a:rPr lang="en-US" sz="4400" dirty="0" smtClean="0"/>
+            </a:br>
+            <a:r>
+              <a:rPr lang="en-US" sz="3600" dirty="0" err="1">
+                <a:solidFill>
+                  <a:srgbClr val="F0AD00"/>
+                </a:solidFill>
+              </a:rPr>
+              <a:t>configration</a:t>
+            </a:r>
+            <a:endParaRPr lang="en-US" sz="3600" dirty="0"/>
+          </a:p>
+        </p:txBody>
+      </p:sp>
+      <p:sp>
+        <p:nvSpPr>
+          <p:cNvPr id="4" name="Slide Number Placeholder 3"/>
+          <p:cNvSpPr>
+            <a:spLocks noGrp="1"/>
+          </p:cNvSpPr>
+          <p:nvPr>
+            <p:ph type="sldNum" sz="quarter" idx="12"/>
+          </p:nvPr>
+        </p:nvSpPr>
+        <p:spPr/>
+        <p:txBody>
+          <a:bodyPr/>
+          <a:lstStyle/>
+          <a:p>
+            <a:fld id="{B6F15528-21DE-4FAA-801E-634DDDAF4B2B}" type="slidenum">
+              <a:rPr lang="en-US" smtClean="0"/>
+              <a:pPr/>
+              <a:t>25</a:t>
+            </a:fld>
+            <a:endParaRPr lang="en-US"/>
+          </a:p>
+        </p:txBody>
+      </p:sp>
+      <p:sp>
+        <p:nvSpPr>
+          <p:cNvPr id="3" name="Content Placeholder 2"/>
+          <p:cNvSpPr>
+            <a:spLocks noGrp="1"/>
+          </p:cNvSpPr>
+          <p:nvPr>
+            <p:ph idx="1"/>
+          </p:nvPr>
+        </p:nvSpPr>
+        <p:spPr>
+          <a:xfrm>
+            <a:off x="304800" y="1775191"/>
+            <a:ext cx="8229600" cy="4625609"/>
+          </a:xfrm>
+        </p:spPr>
+        <p:txBody>
+          <a:bodyPr>
+            <a:normAutofit lnSpcReduction="10000"/>
+          </a:bodyPr>
+          <a:lstStyle/>
+          <a:p>
+            <a:pPr>
+              <a:buFont typeface="Wingdings 2" charset="2"/>
+              <a:buChar char=""/>
+            </a:pPr>
+            <a:r>
+              <a:rPr lang="en-US" dirty="0" err="1"/>
+              <a:t>neighbor.conf</a:t>
+            </a:r>
+            <a:r>
+              <a:rPr lang="en-US" dirty="0"/>
+              <a:t>, for non-MPI standalone </a:t>
+            </a:r>
+            <a:r>
+              <a:rPr lang="en-US" dirty="0" smtClean="0"/>
+              <a:t>deployment</a:t>
+            </a:r>
+          </a:p>
+          <a:p>
+            <a:pPr lvl="1">
+              <a:buFont typeface="Wingdings 2" charset="2"/>
+              <a:buChar char=""/>
+            </a:pPr>
+            <a:r>
+              <a:rPr lang="en-US" dirty="0" err="1"/>
+              <a:t>l</a:t>
+            </a:r>
+            <a:r>
+              <a:rPr lang="en-US" dirty="0" err="1" smtClean="0"/>
+              <a:t>ocalhost</a:t>
+            </a:r>
+            <a:r>
+              <a:rPr lang="en-US" dirty="0" smtClean="0"/>
+              <a:t> 50000</a:t>
+            </a:r>
+          </a:p>
+          <a:p>
+            <a:pPr lvl="1">
+              <a:buFont typeface="Wingdings 2" charset="2"/>
+              <a:buChar char=""/>
+            </a:pPr>
+            <a:r>
+              <a:rPr lang="en-US" dirty="0" err="1"/>
+              <a:t>l</a:t>
+            </a:r>
+            <a:r>
+              <a:rPr lang="en-US" dirty="0" err="1" smtClean="0"/>
+              <a:t>ocalhost</a:t>
+            </a:r>
+            <a:r>
+              <a:rPr lang="en-US" dirty="0" smtClean="0"/>
+              <a:t> 50001</a:t>
+            </a:r>
+          </a:p>
+          <a:p>
+            <a:pPr lvl="1">
+              <a:buFont typeface="Wingdings 2" charset="2"/>
+              <a:buChar char=""/>
+            </a:pPr>
+            <a:r>
+              <a:rPr lang="en-US" dirty="0" smtClean="0"/>
+              <a:t>You </a:t>
+            </a:r>
+            <a:r>
+              <a:rPr lang="en-US" dirty="0"/>
+              <a:t>MUST actually launch two ZHT servers at port 50000 and 50001, otherwise errors prompt</a:t>
+            </a:r>
+            <a:r>
+              <a:rPr lang="en-US" dirty="0" smtClean="0"/>
+              <a:t>.</a:t>
+            </a:r>
+            <a:endParaRPr lang="en-US" dirty="0"/>
+          </a:p>
+          <a:p>
+            <a:pPr>
+              <a:buFont typeface="Wingdings 2" charset="2"/>
+              <a:buChar char=""/>
+            </a:pPr>
+            <a:r>
+              <a:rPr lang="en-US" dirty="0" err="1">
+                <a:solidFill>
+                  <a:srgbClr val="000000"/>
+                </a:solidFill>
+              </a:rPr>
+              <a:t>neighbor.conf</a:t>
+            </a:r>
+            <a:r>
+              <a:rPr lang="en-US" dirty="0">
+                <a:solidFill>
+                  <a:srgbClr val="000000"/>
+                </a:solidFill>
+              </a:rPr>
+              <a:t>, for non-MPI cluster </a:t>
+            </a:r>
+            <a:r>
+              <a:rPr lang="en-US" dirty="0" smtClean="0">
+                <a:solidFill>
+                  <a:srgbClr val="000000"/>
+                </a:solidFill>
+              </a:rPr>
+              <a:t>deployment</a:t>
+            </a:r>
+          </a:p>
+          <a:p>
+            <a:pPr lvl="1">
+              <a:buFont typeface="Wingdings 2" charset="2"/>
+              <a:buChar char=""/>
+            </a:pPr>
+            <a:r>
+              <a:rPr lang="en-US" dirty="0" smtClean="0">
+                <a:solidFill>
+                  <a:srgbClr val="000000"/>
+                </a:solidFill>
+              </a:rPr>
+              <a:t>192.168.1.100 50000</a:t>
+            </a:r>
+          </a:p>
+          <a:p>
+            <a:pPr lvl="1">
+              <a:buFont typeface="Wingdings 2" charset="2"/>
+              <a:buChar char=""/>
+            </a:pPr>
+            <a:r>
+              <a:rPr lang="en-US" dirty="0" smtClean="0">
+                <a:solidFill>
+                  <a:srgbClr val="000000"/>
+                </a:solidFill>
+              </a:rPr>
+              <a:t>192.168.1.101 </a:t>
+            </a:r>
+            <a:r>
+              <a:rPr lang="en-US" dirty="0">
+                <a:solidFill>
+                  <a:srgbClr val="000000"/>
+                </a:solidFill>
+              </a:rPr>
+              <a:t>50000</a:t>
+            </a:r>
+            <a:endParaRPr lang="en-US" dirty="0"/>
+          </a:p>
+          <a:p>
+            <a:pPr lvl="1">
+              <a:buFont typeface="Wingdings 2" charset="2"/>
+              <a:buChar char=""/>
+            </a:pPr>
+            <a:endParaRPr lang="en-US" dirty="0"/>
+          </a:p>
+          <a:p>
+            <a:pPr lvl="1">
+              <a:buFont typeface="Wingdings 2" charset="2"/>
+              <a:buChar char=""/>
+            </a:pPr>
+            <a:endParaRPr lang="en-US" dirty="0" smtClean="0"/>
+          </a:p>
+          <a:p>
+            <a:pPr lvl="2"/>
+            <a:endParaRPr lang="en-US" dirty="0"/>
+          </a:p>
+          <a:p>
+            <a:pPr lvl="1"/>
+            <a:endParaRPr lang="en-US" dirty="0"/>
+          </a:p>
+        </p:txBody>
+      </p:sp>
+    </p:spTree>
+    <p:extLst>
+      <p:ext uri="{BB962C8B-B14F-4D97-AF65-F5344CB8AC3E}">
+        <p14:creationId xmlns:p14="http://schemas.microsoft.com/office/powerpoint/2010/main" val="2786396897"/>
+      </p:ext>
+    </p:extLst>
+  </p:cSld>
+  <p:clrMapOvr>
+    <a:masterClrMapping/>
+  </p:clrMapOvr>
+  <p:timing>
+    <p:tnLst>
+      <p:par>
+        <p:cTn id="1" dur="indefinite" restart="never" nodeType="tmRoot"/>
+      </p:par>
+    </p:tnLst>
+  </p:timing>
+</p:sld>
+</file>
+
+<file path=ppt/slides/slide26.xml><?xml version="1.0" encoding="utf-8"?>
+<p:sld xmlns:a="http://schemas.openxmlformats.org/drawingml/2006/main" xmlns:r="http://schemas.openxmlformats.org/officeDocument/2006/relationships" xmlns:p="http://schemas.openxmlformats.org/presentationml/2006/main">
+  <p:cSld>
+    <p:spTree>
+      <p:nvGrpSpPr>
+        <p:cNvPr id="1" name=""/>
+        <p:cNvGrpSpPr/>
+        <p:nvPr/>
+      </p:nvGrpSpPr>
+      <p:grpSpPr>
+        <a:xfrm>
+          <a:off x="0" y="0"/>
+          <a:ext cx="0" cy="0"/>
+          <a:chOff x="0" y="0"/>
+          <a:chExt cx="0" cy="0"/>
+        </a:xfrm>
+      </p:grpSpPr>
+      <p:sp>
+        <p:nvSpPr>
+          <p:cNvPr id="2" name="Title 1"/>
+          <p:cNvSpPr>
+            <a:spLocks noGrp="1"/>
+          </p:cNvSpPr>
+          <p:nvPr>
+            <p:ph type="title"/>
+          </p:nvPr>
+        </p:nvSpPr>
+        <p:spPr>
+          <a:xfrm>
+            <a:off x="0" y="155448"/>
+            <a:ext cx="9144000" cy="1252728"/>
+          </a:xfrm>
+        </p:spPr>
+        <p:txBody>
+          <a:bodyPr>
+            <a:noAutofit/>
+          </a:bodyPr>
+          <a:lstStyle/>
+          <a:p>
+            <a:r>
+              <a:rPr lang="en-US" sz="4400" dirty="0" smtClean="0"/>
+              <a:t>How to </a:t>
+            </a:r>
+            <a:r>
+              <a:rPr lang="en-US" sz="4400" dirty="0" err="1" smtClean="0"/>
+              <a:t>dev</a:t>
+            </a:r>
+            <a:r>
+              <a:rPr lang="en-US" sz="4400" dirty="0" smtClean="0"/>
+              <a:t> your ZHT apps-</a:t>
+            </a:r>
+            <a:br>
+              <a:rPr lang="en-US" sz="4400" dirty="0" smtClean="0"/>
+            </a:br>
+            <a:r>
+              <a:rPr lang="en-US" sz="3600" dirty="0" err="1">
+                <a:solidFill>
+                  <a:srgbClr val="F0AD00"/>
+                </a:solidFill>
+              </a:rPr>
+              <a:t>configration</a:t>
+            </a:r>
+            <a:endParaRPr lang="en-US" sz="3600" dirty="0"/>
+          </a:p>
+        </p:txBody>
+      </p:sp>
+      <p:sp>
+        <p:nvSpPr>
+          <p:cNvPr id="4" name="Slide Number Placeholder 3"/>
+          <p:cNvSpPr>
+            <a:spLocks noGrp="1"/>
+          </p:cNvSpPr>
+          <p:nvPr>
+            <p:ph type="sldNum" sz="quarter" idx="12"/>
+          </p:nvPr>
+        </p:nvSpPr>
+        <p:spPr/>
+        <p:txBody>
+          <a:bodyPr/>
+          <a:lstStyle/>
+          <a:p>
+            <a:fld id="{B6F15528-21DE-4FAA-801E-634DDDAF4B2B}" type="slidenum">
+              <a:rPr lang="en-US" smtClean="0"/>
+              <a:pPr/>
+              <a:t>26</a:t>
+            </a:fld>
+            <a:endParaRPr lang="en-US"/>
+          </a:p>
+        </p:txBody>
+      </p:sp>
+      <p:sp>
+        <p:nvSpPr>
+          <p:cNvPr id="3" name="Content Placeholder 2"/>
+          <p:cNvSpPr>
+            <a:spLocks noGrp="1"/>
+          </p:cNvSpPr>
+          <p:nvPr>
+            <p:ph idx="1"/>
+          </p:nvPr>
+        </p:nvSpPr>
+        <p:spPr>
+          <a:xfrm>
+            <a:off x="304800" y="1775191"/>
+            <a:ext cx="8229600" cy="4625609"/>
+          </a:xfrm>
+        </p:spPr>
+        <p:txBody>
+          <a:bodyPr>
+            <a:normAutofit lnSpcReduction="10000"/>
+          </a:bodyPr>
+          <a:lstStyle/>
+          <a:p>
+            <a:pPr>
+              <a:buFont typeface="Wingdings 2" charset="2"/>
+              <a:buChar char=""/>
+            </a:pPr>
+            <a:r>
+              <a:rPr lang="en-US" dirty="0" err="1" smtClean="0"/>
+              <a:t>neighbor.mpi.conf</a:t>
+            </a:r>
+            <a:r>
+              <a:rPr lang="en-US" dirty="0"/>
+              <a:t>, for MPI standalone deployment</a:t>
+            </a:r>
+          </a:p>
+          <a:p>
+            <a:pPr lvl="1">
+              <a:buFont typeface="Wingdings 2" charset="2"/>
+              <a:buChar char=""/>
+            </a:pPr>
+            <a:r>
+              <a:rPr lang="en-US" dirty="0" err="1" smtClean="0"/>
+              <a:t>localhost</a:t>
+            </a:r>
+            <a:endParaRPr lang="en-US" dirty="0" smtClean="0"/>
+          </a:p>
+          <a:p>
+            <a:pPr lvl="1">
+              <a:buFont typeface="Wingdings 2" charset="2"/>
+              <a:buChar char=""/>
+            </a:pPr>
+            <a:r>
+              <a:rPr lang="en-US" dirty="0"/>
+              <a:t>Only </a:t>
+            </a:r>
+            <a:r>
+              <a:rPr lang="en-US" dirty="0" err="1"/>
+              <a:t>localhost</a:t>
+            </a:r>
+            <a:r>
+              <a:rPr lang="en-US" dirty="0"/>
+              <a:t> for multiple ZHT servers </a:t>
+            </a:r>
+            <a:r>
+              <a:rPr lang="en-US" dirty="0" smtClean="0"/>
+              <a:t>launched</a:t>
+            </a:r>
+          </a:p>
+          <a:p>
+            <a:pPr>
+              <a:buFont typeface="Wingdings 2" charset="2"/>
+              <a:buChar char=""/>
+            </a:pPr>
+            <a:r>
+              <a:rPr lang="en-US" dirty="0" err="1" smtClean="0">
+                <a:solidFill>
+                  <a:srgbClr val="000000"/>
+                </a:solidFill>
+              </a:rPr>
+              <a:t>neighbor.mpi.conf</a:t>
+            </a:r>
+            <a:r>
+              <a:rPr lang="en-US" dirty="0">
+                <a:solidFill>
+                  <a:srgbClr val="000000"/>
+                </a:solidFill>
+              </a:rPr>
+              <a:t>, for MPI cluster deployment, no port </a:t>
+            </a:r>
+            <a:r>
+              <a:rPr lang="en-US" dirty="0" smtClean="0">
+                <a:solidFill>
+                  <a:srgbClr val="000000"/>
+                </a:solidFill>
+              </a:rPr>
+              <a:t>needed</a:t>
+            </a:r>
+            <a:endParaRPr lang="en-US" dirty="0" smtClean="0"/>
+          </a:p>
+          <a:p>
+            <a:pPr lvl="1">
+              <a:buFont typeface="Wingdings 2" charset="2"/>
+              <a:buChar char=""/>
+            </a:pPr>
+            <a:r>
+              <a:rPr lang="en-US" dirty="0" smtClean="0">
+                <a:solidFill>
+                  <a:srgbClr val="000000"/>
+                </a:solidFill>
+              </a:rPr>
+              <a:t>192.168.1.100</a:t>
+            </a:r>
+          </a:p>
+          <a:p>
+            <a:pPr lvl="1">
+              <a:buFont typeface="Wingdings 2" charset="2"/>
+              <a:buChar char=""/>
+            </a:pPr>
+            <a:r>
+              <a:rPr lang="en-US" dirty="0" smtClean="0">
+                <a:solidFill>
+                  <a:srgbClr val="000000"/>
+                </a:solidFill>
+              </a:rPr>
+              <a:t>192.168.1.101</a:t>
+            </a:r>
+          </a:p>
+          <a:p>
+            <a:pPr lvl="1">
+              <a:buFont typeface="Wingdings 2" charset="2"/>
+              <a:buChar char=""/>
+            </a:pPr>
+            <a:r>
+              <a:rPr lang="en-US" dirty="0" smtClean="0">
+                <a:solidFill>
+                  <a:srgbClr val="000000"/>
+                </a:solidFill>
+              </a:rPr>
+              <a:t>192.168.1.102</a:t>
+            </a:r>
+            <a:endParaRPr lang="en-US" dirty="0"/>
+          </a:p>
+          <a:p>
+            <a:pPr lvl="1">
+              <a:buFont typeface="Wingdings 2" charset="2"/>
+              <a:buChar char=""/>
+            </a:pPr>
+            <a:endParaRPr lang="en-US" dirty="0"/>
+          </a:p>
+          <a:p>
+            <a:pPr lvl="1">
+              <a:buFont typeface="Wingdings 2" charset="2"/>
+              <a:buChar char=""/>
+            </a:pPr>
+            <a:endParaRPr lang="en-US" dirty="0" smtClean="0"/>
+          </a:p>
+          <a:p>
+            <a:pPr lvl="2"/>
+            <a:endParaRPr lang="en-US" dirty="0"/>
+          </a:p>
+          <a:p>
+            <a:pPr lvl="1"/>
+            <a:endParaRPr lang="en-US" dirty="0"/>
+          </a:p>
+        </p:txBody>
+      </p:sp>
+    </p:spTree>
+    <p:extLst>
+      <p:ext uri="{BB962C8B-B14F-4D97-AF65-F5344CB8AC3E}">
+        <p14:creationId xmlns:p14="http://schemas.microsoft.com/office/powerpoint/2010/main" val="3058904017"/>
+      </p:ext>
+    </p:extLst>
+  </p:cSld>
+  <p:clrMapOvr>
+    <a:masterClrMapping/>
+  </p:clrMapOvr>
+  <p:timing>
+    <p:tnLst>
+      <p:par>
+        <p:cTn id="1" dur="indefinite" restart="never" nodeType="tmRoot"/>
+      </p:par>
+    </p:tnLst>
+  </p:timing>
+</p:sld>
+</file>
+
+<file path=ppt/slides/slide27.xml><?xml version="1.0" encoding="utf-8"?>
+<p:sld xmlns:a="http://schemas.openxmlformats.org/drawingml/2006/main" xmlns:r="http://schemas.openxmlformats.org/officeDocument/2006/relationships" xmlns:p="http://schemas.openxmlformats.org/presentationml/2006/main">
+  <p:cSld>
+    <p:spTree>
+      <p:nvGrpSpPr>
+        <p:cNvPr id="1" name=""/>
+        <p:cNvGrpSpPr/>
+        <p:nvPr/>
+      </p:nvGrpSpPr>
+      <p:grpSpPr>
+        <a:xfrm>
+          <a:off x="0" y="0"/>
+          <a:ext cx="0" cy="0"/>
+          <a:chOff x="0" y="0"/>
+          <a:chExt cx="0" cy="0"/>
+        </a:xfrm>
+      </p:grpSpPr>
+      <p:sp>
+        <p:nvSpPr>
+          <p:cNvPr id="2" name="Title 1"/>
+          <p:cNvSpPr>
+            <a:spLocks noGrp="1"/>
+          </p:cNvSpPr>
+          <p:nvPr>
+            <p:ph type="title"/>
+          </p:nvPr>
+        </p:nvSpPr>
+        <p:spPr>
+          <a:xfrm>
+            <a:off x="0" y="155448"/>
+            <a:ext cx="9144000" cy="1252728"/>
+          </a:xfrm>
+        </p:spPr>
+        <p:txBody>
+          <a:bodyPr>
+            <a:noAutofit/>
+          </a:bodyPr>
+          <a:lstStyle/>
+          <a:p>
+            <a:r>
+              <a:rPr lang="en-US" sz="4400" dirty="0" smtClean="0"/>
+              <a:t>How to </a:t>
+            </a:r>
+            <a:r>
+              <a:rPr lang="en-US" sz="4400" dirty="0" err="1" smtClean="0"/>
+              <a:t>dev</a:t>
+            </a:r>
+            <a:r>
+              <a:rPr lang="en-US" sz="4400" dirty="0" smtClean="0"/>
+              <a:t> your ZHT apps-</a:t>
+            </a:r>
+            <a:br>
+              <a:rPr lang="en-US" sz="4400" dirty="0" smtClean="0"/>
+            </a:br>
+            <a:r>
+              <a:rPr lang="en-US" sz="3600" dirty="0" err="1">
+                <a:solidFill>
+                  <a:srgbClr val="F0AD00"/>
+                </a:solidFill>
+              </a:rPr>
+              <a:t>configration</a:t>
+            </a:r>
+            <a:endParaRPr lang="en-US" sz="3600" dirty="0"/>
+          </a:p>
+        </p:txBody>
+      </p:sp>
+      <p:sp>
+        <p:nvSpPr>
+          <p:cNvPr id="4" name="Slide Number Placeholder 3"/>
+          <p:cNvSpPr>
+            <a:spLocks noGrp="1"/>
+          </p:cNvSpPr>
+          <p:nvPr>
+            <p:ph type="sldNum" sz="quarter" idx="12"/>
+          </p:nvPr>
+        </p:nvSpPr>
+        <p:spPr/>
+        <p:txBody>
+          <a:bodyPr/>
+          <a:lstStyle/>
+          <a:p>
+            <a:fld id="{B6F15528-21DE-4FAA-801E-634DDDAF4B2B}" type="slidenum">
+              <a:rPr lang="en-US" smtClean="0"/>
+              <a:pPr/>
+              <a:t>27</a:t>
+            </a:fld>
+            <a:endParaRPr lang="en-US"/>
+          </a:p>
+        </p:txBody>
+      </p:sp>
+      <p:sp>
+        <p:nvSpPr>
+          <p:cNvPr id="3" name="Content Placeholder 2"/>
+          <p:cNvSpPr>
+            <a:spLocks noGrp="1"/>
+          </p:cNvSpPr>
+          <p:nvPr>
+            <p:ph idx="1"/>
+          </p:nvPr>
+        </p:nvSpPr>
+        <p:spPr>
+          <a:xfrm>
+            <a:off x="304800" y="1775191"/>
+            <a:ext cx="8229600" cy="4625609"/>
+          </a:xfrm>
+        </p:spPr>
+        <p:txBody>
+          <a:bodyPr>
+            <a:normAutofit/>
+          </a:bodyPr>
+          <a:lstStyle/>
+          <a:p>
+            <a:pPr>
+              <a:lnSpc>
+                <a:spcPct val="100000"/>
+              </a:lnSpc>
+            </a:pPr>
+            <a:r>
+              <a:rPr lang="en-US" dirty="0" smtClean="0">
+                <a:solidFill>
+                  <a:srgbClr val="000000"/>
+                </a:solidFill>
+              </a:rPr>
+              <a:t>launch </a:t>
+            </a:r>
+            <a:r>
+              <a:rPr lang="en-US" dirty="0">
+                <a:solidFill>
+                  <a:srgbClr val="000000"/>
+                </a:solidFill>
+              </a:rPr>
+              <a:t>your applications always with </a:t>
+            </a:r>
+            <a:r>
+              <a:rPr lang="en-US" dirty="0" err="1">
+                <a:solidFill>
+                  <a:srgbClr val="FF0000"/>
+                </a:solidFill>
+              </a:rPr>
+              <a:t>zht.conf</a:t>
+            </a:r>
+            <a:r>
+              <a:rPr lang="en-US" dirty="0">
+                <a:solidFill>
+                  <a:srgbClr val="000000"/>
+                </a:solidFill>
+              </a:rPr>
+              <a:t> and </a:t>
+            </a:r>
+            <a:r>
+              <a:rPr lang="en-US" dirty="0" err="1">
+                <a:solidFill>
+                  <a:srgbClr val="FF0000"/>
+                </a:solidFill>
+              </a:rPr>
+              <a:t>neighbor.conf</a:t>
+            </a:r>
+            <a:r>
+              <a:rPr lang="en-US" dirty="0">
+                <a:solidFill>
+                  <a:srgbClr val="000000"/>
+                </a:solidFill>
+              </a:rPr>
+              <a:t>(or </a:t>
+            </a:r>
+            <a:r>
+              <a:rPr lang="en-US" dirty="0" err="1">
+                <a:solidFill>
+                  <a:srgbClr val="FF0000"/>
+                </a:solidFill>
+              </a:rPr>
+              <a:t>neighbor.mpi.conf</a:t>
+            </a:r>
+            <a:r>
+              <a:rPr lang="en-US" dirty="0">
+                <a:solidFill>
+                  <a:srgbClr val="000000"/>
+                </a:solidFill>
+              </a:rPr>
+              <a:t>) as </a:t>
+            </a:r>
+            <a:r>
+              <a:rPr lang="en-US" u="sng" dirty="0">
+                <a:solidFill>
+                  <a:srgbClr val="FF0000"/>
+                </a:solidFill>
+              </a:rPr>
+              <a:t>startup </a:t>
+            </a:r>
+            <a:r>
+              <a:rPr lang="en-US" u="sng" dirty="0" smtClean="0">
+                <a:solidFill>
+                  <a:srgbClr val="FF0000"/>
+                </a:solidFill>
+              </a:rPr>
+              <a:t>arguments</a:t>
+            </a:r>
+          </a:p>
+          <a:p>
+            <a:pPr>
+              <a:lnSpc>
+                <a:spcPct val="100000"/>
+              </a:lnSpc>
+            </a:pPr>
+            <a:endParaRPr lang="en-US" u="sng" dirty="0" smtClean="0">
+              <a:solidFill>
+                <a:srgbClr val="FF0000"/>
+              </a:solidFill>
+            </a:endParaRPr>
+          </a:p>
+          <a:p>
+            <a:pPr>
+              <a:lnSpc>
+                <a:spcPct val="100000"/>
+              </a:lnSpc>
+            </a:pPr>
+            <a:r>
+              <a:rPr lang="en-US" u="sng" dirty="0" smtClean="0">
+                <a:solidFill>
+                  <a:srgbClr val="FF0000"/>
+                </a:solidFill>
+              </a:rPr>
+              <a:t>Be careful the path for configuration files</a:t>
+            </a:r>
+            <a:endParaRPr lang="en-US" dirty="0"/>
+          </a:p>
+          <a:p>
+            <a:pPr lvl="1">
+              <a:buFont typeface="Wingdings 2" charset="2"/>
+              <a:buChar char=""/>
+            </a:pPr>
+            <a:endParaRPr lang="en-US" dirty="0"/>
+          </a:p>
+          <a:p>
+            <a:pPr lvl="1">
+              <a:buFont typeface="Wingdings 2" charset="2"/>
+              <a:buChar char=""/>
+            </a:pPr>
+            <a:endParaRPr lang="en-US" dirty="0" smtClean="0"/>
+          </a:p>
+          <a:p>
+            <a:pPr lvl="2"/>
+            <a:endParaRPr lang="en-US" dirty="0"/>
+          </a:p>
+          <a:p>
+            <a:pPr lvl="1"/>
+            <a:endParaRPr lang="en-US" dirty="0"/>
+          </a:p>
+        </p:txBody>
+      </p:sp>
+    </p:spTree>
+    <p:extLst>
+      <p:ext uri="{BB962C8B-B14F-4D97-AF65-F5344CB8AC3E}">
+        <p14:creationId xmlns:p14="http://schemas.microsoft.com/office/powerpoint/2010/main" val="4195513805"/>
+      </p:ext>
+    </p:extLst>
+  </p:cSld>
+  <p:clrMapOvr>
+    <a:masterClrMapping/>
+  </p:clrMapOvr>
+  <p:timing>
+    <p:tnLst>
+      <p:par>
+        <p:cTn id="1" dur="indefinite" restart="never" nodeType="tmRoot"/>
+      </p:par>
+    </p:tnLst>
+  </p:timing>
+</p:sld>
+</file>
+
+<file path=ppt/slides/slide28.xml><?xml version="1.0" encoding="utf-8"?>
+<p:sld xmlns:a="http://schemas.openxmlformats.org/drawingml/2006/main" xmlns:r="http://schemas.openxmlformats.org/officeDocument/2006/relationships" xmlns:p="http://schemas.openxmlformats.org/presentationml/2006/main">
+  <p:cSld>
+    <p:spTree>
+      <p:nvGrpSpPr>
+        <p:cNvPr id="1" name=""/>
+        <p:cNvGrpSpPr/>
+        <p:nvPr/>
+      </p:nvGrpSpPr>
+      <p:grpSpPr>
+        <a:xfrm>
+          <a:off x="0" y="0"/>
+          <a:ext cx="0" cy="0"/>
+          <a:chOff x="0" y="0"/>
+          <a:chExt cx="0" cy="0"/>
+        </a:xfrm>
+      </p:grpSpPr>
+      <p:sp>
+        <p:nvSpPr>
+          <p:cNvPr id="2" name="Title 1"/>
+          <p:cNvSpPr>
+            <a:spLocks noGrp="1"/>
+          </p:cNvSpPr>
+          <p:nvPr>
+            <p:ph type="title"/>
+          </p:nvPr>
+        </p:nvSpPr>
+        <p:spPr>
+          <a:xfrm>
+            <a:off x="0" y="155448"/>
+            <a:ext cx="9144000" cy="1252728"/>
+          </a:xfrm>
+        </p:spPr>
+        <p:txBody>
+          <a:bodyPr>
+            <a:noAutofit/>
+          </a:bodyPr>
+          <a:lstStyle/>
+          <a:p>
+            <a:r>
+              <a:rPr lang="en-US" sz="4400" dirty="0" smtClean="0"/>
+              <a:t>How to </a:t>
+            </a:r>
+            <a:r>
+              <a:rPr lang="en-US" sz="4400" dirty="0" err="1" smtClean="0"/>
+              <a:t>dev</a:t>
+            </a:r>
+            <a:r>
+              <a:rPr lang="en-US" sz="4400" dirty="0" smtClean="0"/>
+              <a:t> your ZHT apps-</a:t>
+            </a:r>
+            <a:br>
+              <a:rPr lang="en-US" sz="4400" dirty="0" smtClean="0"/>
+            </a:br>
+            <a:r>
+              <a:rPr lang="en-US" sz="3600" dirty="0" smtClean="0">
+                <a:solidFill>
+                  <a:srgbClr val="F0AD00"/>
+                </a:solidFill>
+              </a:rPr>
+              <a:t>TWO special API(s</a:t>
+            </a:r>
+            <a:r>
+              <a:rPr lang="en-US" sz="3600" dirty="0">
+                <a:solidFill>
+                  <a:srgbClr val="F0AD00"/>
+                </a:solidFill>
+              </a:rPr>
+              <a:t>)</a:t>
+            </a:r>
+            <a:endParaRPr lang="en-US" sz="3600" dirty="0"/>
+          </a:p>
+        </p:txBody>
+      </p:sp>
+      <p:sp>
+        <p:nvSpPr>
+          <p:cNvPr id="4" name="Slide Number Placeholder 3"/>
+          <p:cNvSpPr>
+            <a:spLocks noGrp="1"/>
+          </p:cNvSpPr>
+          <p:nvPr>
+            <p:ph type="sldNum" sz="quarter" idx="12"/>
+          </p:nvPr>
+        </p:nvSpPr>
+        <p:spPr/>
+        <p:txBody>
+          <a:bodyPr/>
+          <a:lstStyle/>
+          <a:p>
+            <a:fld id="{B6F15528-21DE-4FAA-801E-634DDDAF4B2B}" type="slidenum">
+              <a:rPr lang="en-US" smtClean="0"/>
+              <a:pPr/>
+              <a:t>28</a:t>
+            </a:fld>
+            <a:endParaRPr lang="en-US"/>
+          </a:p>
+        </p:txBody>
+      </p:sp>
+      <p:sp>
+        <p:nvSpPr>
+          <p:cNvPr id="3" name="Content Placeholder 2"/>
+          <p:cNvSpPr>
+            <a:spLocks noGrp="1"/>
+          </p:cNvSpPr>
+          <p:nvPr>
+            <p:ph idx="1"/>
+          </p:nvPr>
+        </p:nvSpPr>
+        <p:spPr>
+          <a:xfrm>
+            <a:off x="304800" y="1775191"/>
+            <a:ext cx="8229600" cy="4625609"/>
+          </a:xfrm>
+        </p:spPr>
+        <p:txBody>
+          <a:bodyPr>
+            <a:normAutofit fontScale="77500" lnSpcReduction="20000"/>
+          </a:bodyPr>
+          <a:lstStyle/>
+          <a:p>
+            <a:pPr>
+              <a:lnSpc>
+                <a:spcPct val="100000"/>
+              </a:lnSpc>
+            </a:pPr>
+            <a:r>
+              <a:rPr lang="en-US" dirty="0" err="1"/>
+              <a:t>int</a:t>
+            </a:r>
+            <a:r>
+              <a:rPr lang="en-US" dirty="0"/>
+              <a:t> </a:t>
+            </a:r>
+            <a:r>
+              <a:rPr lang="en-US" dirty="0" err="1">
+                <a:solidFill>
+                  <a:srgbClr val="0070C0"/>
+                </a:solidFill>
+              </a:rPr>
+              <a:t>c_state_change_callback</a:t>
+            </a:r>
+            <a:r>
+              <a:rPr lang="en-US" dirty="0"/>
+              <a:t>(</a:t>
+            </a:r>
+            <a:r>
+              <a:rPr lang="en-US" dirty="0" err="1"/>
+              <a:t>const</a:t>
+            </a:r>
+            <a:r>
+              <a:rPr lang="en-US" dirty="0"/>
+              <a:t> char *key, </a:t>
+            </a:r>
+            <a:r>
+              <a:rPr lang="en-US" dirty="0" err="1"/>
+              <a:t>const</a:t>
+            </a:r>
+            <a:r>
+              <a:rPr lang="en-US" dirty="0"/>
+              <a:t> char *</a:t>
+            </a:r>
+            <a:r>
+              <a:rPr lang="en-US" dirty="0" err="1" smtClean="0"/>
+              <a:t>expeded_val</a:t>
+            </a:r>
+            <a:r>
+              <a:rPr lang="en-US" dirty="0" smtClean="0"/>
+              <a:t>, </a:t>
+            </a:r>
+            <a:r>
+              <a:rPr lang="en-US" dirty="0" err="1" smtClean="0"/>
+              <a:t>int</a:t>
+            </a:r>
+            <a:r>
+              <a:rPr lang="en-US" dirty="0" smtClean="0"/>
+              <a:t> </a:t>
+            </a:r>
+            <a:r>
+              <a:rPr lang="en-US" dirty="0"/>
+              <a:t>lease</a:t>
+            </a:r>
+            <a:r>
+              <a:rPr lang="en-US" dirty="0" smtClean="0"/>
+              <a:t>), in C</a:t>
+            </a:r>
+          </a:p>
+          <a:p>
+            <a:r>
+              <a:rPr lang="en-US" dirty="0" err="1"/>
+              <a:t>int</a:t>
+            </a:r>
+            <a:r>
+              <a:rPr lang="en-US" dirty="0"/>
+              <a:t> </a:t>
+            </a:r>
+            <a:r>
+              <a:rPr lang="en-US" dirty="0" err="1">
+                <a:solidFill>
+                  <a:srgbClr val="0070C0"/>
+                </a:solidFill>
+              </a:rPr>
+              <a:t>state_change_callback</a:t>
+            </a:r>
+            <a:r>
+              <a:rPr lang="en-US" dirty="0"/>
+              <a:t>(</a:t>
+            </a:r>
+            <a:r>
+              <a:rPr lang="en-US" dirty="0" err="1"/>
+              <a:t>const</a:t>
+            </a:r>
+            <a:r>
+              <a:rPr lang="en-US" dirty="0"/>
+              <a:t> string &amp;key, </a:t>
+            </a:r>
+            <a:r>
+              <a:rPr lang="en-US" dirty="0" err="1"/>
+              <a:t>const</a:t>
+            </a:r>
+            <a:r>
+              <a:rPr lang="en-US" dirty="0"/>
+              <a:t> string &amp;</a:t>
+            </a:r>
+            <a:r>
+              <a:rPr lang="en-US" dirty="0" err="1" smtClean="0"/>
+              <a:t>expected_val,int</a:t>
+            </a:r>
+            <a:r>
+              <a:rPr lang="en-US" dirty="0" smtClean="0"/>
+              <a:t> </a:t>
+            </a:r>
+            <a:r>
+              <a:rPr lang="en-US" dirty="0"/>
+              <a:t>lease</a:t>
+            </a:r>
+            <a:r>
+              <a:rPr lang="en-US" dirty="0" smtClean="0"/>
+              <a:t>), in C++</a:t>
+            </a:r>
+          </a:p>
+          <a:p>
+            <a:pPr lvl="1"/>
+            <a:r>
+              <a:rPr lang="en-US" dirty="0">
+                <a:solidFill>
+                  <a:srgbClr val="0070C0"/>
+                </a:solidFill>
+              </a:rPr>
+              <a:t>m</a:t>
+            </a:r>
+            <a:r>
+              <a:rPr lang="en-US" dirty="0" smtClean="0">
+                <a:solidFill>
+                  <a:srgbClr val="0070C0"/>
+                </a:solidFill>
+              </a:rPr>
+              <a:t>onitor the value change of the key, block or unblock ZHT client</a:t>
+            </a:r>
+          </a:p>
+          <a:p>
+            <a:pPr lvl="1"/>
+            <a:r>
+              <a:rPr lang="en-US" dirty="0" smtClean="0">
+                <a:solidFill>
+                  <a:srgbClr val="FF0000"/>
+                </a:solidFill>
+              </a:rPr>
+              <a:t>EXPECDED_VAL</a:t>
+            </a:r>
+            <a:r>
+              <a:rPr lang="en-US" dirty="0" smtClean="0"/>
+              <a:t>: the </a:t>
+            </a:r>
+            <a:r>
+              <a:rPr lang="en-US" dirty="0"/>
+              <a:t>value expected to be equal to what is </a:t>
+            </a:r>
+            <a:r>
+              <a:rPr lang="en-US" dirty="0" err="1"/>
+              <a:t>lookuped</a:t>
+            </a:r>
+            <a:r>
+              <a:rPr lang="en-US" dirty="0"/>
+              <a:t> by the key, if equal, return </a:t>
+            </a:r>
+            <a:r>
+              <a:rPr lang="en-US" dirty="0" smtClean="0"/>
+              <a:t>0(zero), </a:t>
+            </a:r>
+            <a:r>
+              <a:rPr lang="en-US" dirty="0"/>
+              <a:t>or keep polling in </a:t>
+            </a:r>
+            <a:r>
+              <a:rPr lang="en-US" dirty="0" smtClean="0"/>
+              <a:t>server-side and </a:t>
+            </a:r>
+            <a:r>
+              <a:rPr lang="en-US" dirty="0" smtClean="0">
+                <a:solidFill>
+                  <a:srgbClr val="0070C0"/>
+                </a:solidFill>
+              </a:rPr>
+              <a:t>block ZHT client</a:t>
+            </a:r>
+          </a:p>
+          <a:p>
+            <a:pPr lvl="1"/>
+            <a:r>
+              <a:rPr lang="en-US" dirty="0">
+                <a:solidFill>
+                  <a:srgbClr val="FF0000"/>
+                </a:solidFill>
+              </a:rPr>
+              <a:t>LEASE</a:t>
+            </a:r>
+            <a:r>
+              <a:rPr lang="en-US" dirty="0"/>
+              <a:t>: </a:t>
+            </a:r>
+            <a:r>
+              <a:rPr lang="en-US" dirty="0" smtClean="0"/>
+              <a:t>the lease in milliseconds after which ZHT client will be </a:t>
+            </a:r>
+            <a:r>
+              <a:rPr lang="en-US" dirty="0" smtClean="0">
+                <a:solidFill>
+                  <a:srgbClr val="0070C0"/>
+                </a:solidFill>
+              </a:rPr>
+              <a:t>unblocked</a:t>
+            </a:r>
+            <a:r>
+              <a:rPr lang="en-US" dirty="0" smtClean="0"/>
+              <a:t>.</a:t>
+            </a:r>
+          </a:p>
+          <a:p>
+            <a:r>
+              <a:rPr lang="en-US" dirty="0"/>
+              <a:t>See &lt;c_zhtclient_threaded_test.cpp</a:t>
+            </a:r>
+            <a:r>
+              <a:rPr lang="en-US" dirty="0" smtClean="0"/>
+              <a:t>&gt; for C example </a:t>
+            </a:r>
+            <a:r>
+              <a:rPr lang="en-US" dirty="0"/>
+              <a:t>and &lt;cpp_zhtclient_threaded_test.cpp</a:t>
+            </a:r>
+            <a:r>
+              <a:rPr lang="en-US" dirty="0" smtClean="0"/>
+              <a:t>&gt; for C++ example</a:t>
+            </a:r>
+          </a:p>
+          <a:p>
+            <a:pPr lvl="1"/>
+            <a:endParaRPr lang="en-US" dirty="0" smtClean="0"/>
+          </a:p>
+          <a:p>
+            <a:pPr lvl="1">
+              <a:buFont typeface="Wingdings 2" charset="2"/>
+              <a:buChar char=""/>
+            </a:pPr>
+            <a:endParaRPr lang="en-US" dirty="0"/>
+          </a:p>
+          <a:p>
+            <a:pPr lvl="1">
+              <a:buFont typeface="Wingdings 2" charset="2"/>
+              <a:buChar char=""/>
+            </a:pPr>
+            <a:endParaRPr lang="en-US" dirty="0" smtClean="0"/>
+          </a:p>
+          <a:p>
+            <a:pPr lvl="2"/>
+            <a:endParaRPr lang="en-US" dirty="0"/>
+          </a:p>
+          <a:p>
+            <a:pPr lvl="1"/>
+            <a:endParaRPr lang="en-US" dirty="0"/>
+          </a:p>
+        </p:txBody>
+      </p:sp>
+    </p:spTree>
+    <p:extLst>
+      <p:ext uri="{BB962C8B-B14F-4D97-AF65-F5344CB8AC3E}">
+        <p14:creationId xmlns:p14="http://schemas.microsoft.com/office/powerpoint/2010/main" val="2665926625"/>
+      </p:ext>
+    </p:extLst>
+  </p:cSld>
+  <p:clrMapOvr>
+    <a:masterClrMapping/>
+  </p:clrMapOvr>
+  <p:timing>
+    <p:tnLst>
+      <p:par>
+        <p:cTn id="1" dur="indefinite" restart="never" nodeType="tmRoot"/>
+      </p:par>
+    </p:tnLst>
+  </p:timing>
+</p:sld>
+</file>
+
+<file path=ppt/slides/slide29.xml><?xml version="1.0" encoding="utf-8"?>
+<p:sld xmlns:a="http://schemas.openxmlformats.org/drawingml/2006/main" xmlns:r="http://schemas.openxmlformats.org/officeDocument/2006/relationships" xmlns:p="http://schemas.openxmlformats.org/presentationml/2006/main">
+  <p:cSld>
+    <p:spTree>
+      <p:nvGrpSpPr>
+        <p:cNvPr id="1" name=""/>
+        <p:cNvGrpSpPr/>
+        <p:nvPr/>
+      </p:nvGrpSpPr>
+      <p:grpSpPr>
+        <a:xfrm>
+          <a:off x="0" y="0"/>
+          <a:ext cx="0" cy="0"/>
+          <a:chOff x="0" y="0"/>
+          <a:chExt cx="0" cy="0"/>
+        </a:xfrm>
+      </p:grpSpPr>
+      <p:sp>
+        <p:nvSpPr>
+          <p:cNvPr id="2" name="Title 1"/>
+          <p:cNvSpPr>
+            <a:spLocks noGrp="1"/>
+          </p:cNvSpPr>
+          <p:nvPr>
+            <p:ph type="title"/>
+          </p:nvPr>
+        </p:nvSpPr>
+        <p:spPr>
+          <a:xfrm>
+            <a:off x="0" y="155448"/>
+            <a:ext cx="9144000" cy="1252728"/>
+          </a:xfrm>
+        </p:spPr>
+        <p:txBody>
+          <a:bodyPr>
+            <a:noAutofit/>
+          </a:bodyPr>
+          <a:lstStyle/>
+          <a:p>
+            <a:r>
+              <a:rPr lang="en-US" sz="4400" dirty="0" smtClean="0"/>
+              <a:t>How to </a:t>
+            </a:r>
+            <a:r>
+              <a:rPr lang="en-US" sz="4400" dirty="0" err="1" smtClean="0"/>
+              <a:t>dev</a:t>
+            </a:r>
+            <a:r>
+              <a:rPr lang="en-US" sz="4400" dirty="0" smtClean="0"/>
+              <a:t> your ZHT apps-</a:t>
+            </a:r>
+            <a:br>
+              <a:rPr lang="en-US" sz="4400" dirty="0" smtClean="0"/>
+            </a:br>
+            <a:r>
+              <a:rPr lang="en-US" sz="3600" dirty="0" smtClean="0">
+                <a:solidFill>
+                  <a:srgbClr val="F0AD00"/>
+                </a:solidFill>
+              </a:rPr>
+              <a:t>TWO special API(s</a:t>
+            </a:r>
+            <a:r>
+              <a:rPr lang="en-US" sz="3600" dirty="0">
+                <a:solidFill>
+                  <a:srgbClr val="F0AD00"/>
+                </a:solidFill>
+              </a:rPr>
+              <a:t>)</a:t>
+            </a:r>
+            <a:endParaRPr lang="en-US" sz="3600" dirty="0"/>
+          </a:p>
+        </p:txBody>
+      </p:sp>
+      <p:sp>
+        <p:nvSpPr>
+          <p:cNvPr id="4" name="Slide Number Placeholder 3"/>
+          <p:cNvSpPr>
+            <a:spLocks noGrp="1"/>
+          </p:cNvSpPr>
+          <p:nvPr>
+            <p:ph type="sldNum" sz="quarter" idx="12"/>
+          </p:nvPr>
+        </p:nvSpPr>
+        <p:spPr/>
+        <p:txBody>
+          <a:bodyPr/>
+          <a:lstStyle/>
+          <a:p>
+            <a:fld id="{B6F15528-21DE-4FAA-801E-634DDDAF4B2B}" type="slidenum">
+              <a:rPr lang="en-US" smtClean="0"/>
+              <a:pPr/>
+              <a:t>29</a:t>
+            </a:fld>
+            <a:endParaRPr lang="en-US"/>
+          </a:p>
+        </p:txBody>
+      </p:sp>
+      <p:sp>
+        <p:nvSpPr>
+          <p:cNvPr id="3" name="Content Placeholder 2"/>
+          <p:cNvSpPr>
+            <a:spLocks noGrp="1"/>
+          </p:cNvSpPr>
+          <p:nvPr>
+            <p:ph idx="1"/>
+          </p:nvPr>
+        </p:nvSpPr>
+        <p:spPr>
+          <a:xfrm>
+            <a:off x="304800" y="1775191"/>
+            <a:ext cx="8229600" cy="4625609"/>
+          </a:xfrm>
+        </p:spPr>
+        <p:txBody>
+          <a:bodyPr>
+            <a:normAutofit fontScale="77500" lnSpcReduction="20000"/>
+          </a:bodyPr>
+          <a:lstStyle/>
+          <a:p>
+            <a:pPr>
+              <a:lnSpc>
+                <a:spcPct val="100000"/>
+              </a:lnSpc>
+            </a:pPr>
+            <a:r>
+              <a:rPr lang="en-US" dirty="0" err="1"/>
+              <a:t>int</a:t>
+            </a:r>
+            <a:r>
+              <a:rPr lang="en-US" dirty="0"/>
+              <a:t> </a:t>
+            </a:r>
+            <a:r>
+              <a:rPr lang="en-US" dirty="0" err="1">
+                <a:solidFill>
+                  <a:srgbClr val="0070C0"/>
+                </a:solidFill>
+              </a:rPr>
+              <a:t>c_zht_compare_swap</a:t>
+            </a:r>
+            <a:r>
+              <a:rPr lang="en-US" dirty="0"/>
+              <a:t>(</a:t>
+            </a:r>
+            <a:r>
+              <a:rPr lang="en-US" dirty="0" err="1"/>
+              <a:t>const</a:t>
+            </a:r>
+            <a:r>
+              <a:rPr lang="en-US" dirty="0"/>
+              <a:t> char *key, </a:t>
+            </a:r>
+            <a:r>
+              <a:rPr lang="en-US" dirty="0" err="1"/>
+              <a:t>const</a:t>
+            </a:r>
+            <a:r>
+              <a:rPr lang="en-US" dirty="0"/>
+              <a:t> char *</a:t>
+            </a:r>
+            <a:r>
+              <a:rPr lang="en-US" dirty="0" err="1" smtClean="0"/>
+              <a:t>seen_value</a:t>
+            </a:r>
+            <a:r>
+              <a:rPr lang="en-US" dirty="0" smtClean="0"/>
+              <a:t>, </a:t>
+            </a:r>
+            <a:r>
+              <a:rPr lang="en-US" dirty="0" err="1" smtClean="0"/>
+              <a:t>const</a:t>
+            </a:r>
+            <a:r>
+              <a:rPr lang="en-US" dirty="0" smtClean="0"/>
+              <a:t> </a:t>
+            </a:r>
+            <a:r>
+              <a:rPr lang="en-US" dirty="0"/>
+              <a:t>char *</a:t>
+            </a:r>
+            <a:r>
+              <a:rPr lang="en-US" dirty="0" err="1"/>
+              <a:t>new_value</a:t>
+            </a:r>
+            <a:r>
+              <a:rPr lang="en-US" dirty="0"/>
+              <a:t>, char *</a:t>
+            </a:r>
+            <a:r>
+              <a:rPr lang="en-US" dirty="0" err="1" smtClean="0"/>
+              <a:t>value_queried</a:t>
+            </a:r>
+            <a:r>
+              <a:rPr lang="en-US" dirty="0" smtClean="0"/>
+              <a:t>), in C</a:t>
+            </a:r>
+          </a:p>
+          <a:p>
+            <a:r>
+              <a:rPr lang="en-US" dirty="0" err="1"/>
+              <a:t>int</a:t>
+            </a:r>
+            <a:r>
+              <a:rPr lang="en-US" dirty="0"/>
+              <a:t> </a:t>
+            </a:r>
+            <a:r>
+              <a:rPr lang="en-US" dirty="0" err="1">
+                <a:solidFill>
+                  <a:srgbClr val="0070C0"/>
+                </a:solidFill>
+              </a:rPr>
+              <a:t>compare_swap</a:t>
+            </a:r>
+            <a:r>
+              <a:rPr lang="en-US" dirty="0"/>
+              <a:t>(</a:t>
+            </a:r>
+            <a:r>
+              <a:rPr lang="en-US" dirty="0" err="1"/>
+              <a:t>const</a:t>
+            </a:r>
+            <a:r>
+              <a:rPr lang="en-US" dirty="0"/>
+              <a:t> string &amp;key, </a:t>
+            </a:r>
+            <a:r>
+              <a:rPr lang="en-US" dirty="0" err="1"/>
+              <a:t>const</a:t>
+            </a:r>
+            <a:r>
+              <a:rPr lang="en-US" dirty="0"/>
+              <a:t> string &amp;</a:t>
+            </a:r>
+            <a:r>
+              <a:rPr lang="en-US" dirty="0" err="1" smtClean="0"/>
+              <a:t>seen_val</a:t>
+            </a:r>
+            <a:r>
+              <a:rPr lang="en-US" dirty="0" smtClean="0"/>
+              <a:t>, </a:t>
+            </a:r>
+            <a:r>
+              <a:rPr lang="nn-NO" dirty="0" smtClean="0"/>
+              <a:t>const </a:t>
+            </a:r>
+            <a:r>
+              <a:rPr lang="nn-NO" dirty="0"/>
+              <a:t>string &amp;new_val, string &amp;result</a:t>
+            </a:r>
+            <a:r>
+              <a:rPr lang="nn-NO" dirty="0" smtClean="0"/>
+              <a:t>)</a:t>
+            </a:r>
+          </a:p>
+          <a:p>
+            <a:pPr lvl="1"/>
+            <a:r>
+              <a:rPr lang="nn-NO" dirty="0" smtClean="0"/>
+              <a:t>Return 0(zero), if </a:t>
+            </a:r>
+            <a:r>
+              <a:rPr lang="en-US" dirty="0" smtClean="0">
+                <a:solidFill>
+                  <a:srgbClr val="FF0000"/>
+                </a:solidFill>
+              </a:rPr>
+              <a:t>SEEN_VALUE </a:t>
+            </a:r>
+            <a:r>
+              <a:rPr lang="en-US" dirty="0" smtClean="0"/>
+              <a:t>equals to </a:t>
+            </a:r>
+            <a:r>
+              <a:rPr lang="en-US" dirty="0"/>
+              <a:t>value </a:t>
+            </a:r>
+            <a:r>
+              <a:rPr lang="en-US" dirty="0" err="1"/>
+              <a:t>lookuped</a:t>
+            </a:r>
+            <a:r>
+              <a:rPr lang="en-US" dirty="0"/>
+              <a:t> by the </a:t>
+            </a:r>
+            <a:r>
+              <a:rPr lang="en-US" dirty="0" smtClean="0"/>
+              <a:t>key, and set the value to </a:t>
+            </a:r>
+            <a:r>
+              <a:rPr lang="en-US" dirty="0" smtClean="0">
+                <a:solidFill>
+                  <a:srgbClr val="FF0000"/>
+                </a:solidFill>
+              </a:rPr>
+              <a:t>NEW_VALUE </a:t>
+            </a:r>
+            <a:r>
+              <a:rPr lang="en-US" dirty="0" smtClean="0"/>
+              <a:t>returned</a:t>
+            </a:r>
+          </a:p>
+          <a:p>
+            <a:pPr lvl="1"/>
+            <a:r>
+              <a:rPr lang="en-US" dirty="0" smtClean="0"/>
+              <a:t>Return non-zero, if the above doesn’t meet, and </a:t>
+            </a:r>
+            <a:r>
+              <a:rPr lang="en-US" dirty="0">
+                <a:solidFill>
+                  <a:srgbClr val="FF0000"/>
+                </a:solidFill>
+              </a:rPr>
+              <a:t>VALUE_QUERIED</a:t>
+            </a:r>
+            <a:endParaRPr lang="en-US" dirty="0"/>
+          </a:p>
+          <a:p>
+            <a:pPr lvl="1"/>
+            <a:r>
+              <a:rPr lang="en-US" dirty="0" smtClean="0">
+                <a:solidFill>
+                  <a:srgbClr val="FF0000"/>
+                </a:solidFill>
+              </a:rPr>
+              <a:t>SEEN_VALUE</a:t>
+            </a:r>
+            <a:r>
+              <a:rPr lang="en-US" dirty="0"/>
+              <a:t>: </a:t>
+            </a:r>
+            <a:r>
+              <a:rPr lang="en-US" dirty="0" smtClean="0"/>
+              <a:t>value expected to be equal to that </a:t>
+            </a:r>
+            <a:r>
+              <a:rPr lang="en-US" dirty="0" err="1" smtClean="0"/>
+              <a:t>lookuped</a:t>
+            </a:r>
+            <a:r>
+              <a:rPr lang="en-US" dirty="0" smtClean="0"/>
+              <a:t> </a:t>
+            </a:r>
+            <a:r>
+              <a:rPr lang="en-US" dirty="0"/>
+              <a:t>by the key</a:t>
+            </a:r>
+          </a:p>
+          <a:p>
+            <a:pPr lvl="1"/>
+            <a:r>
+              <a:rPr lang="en-US" dirty="0" smtClean="0">
+                <a:solidFill>
+                  <a:srgbClr val="FF0000"/>
+                </a:solidFill>
+              </a:rPr>
+              <a:t>NEW_VALUE</a:t>
+            </a:r>
+            <a:r>
+              <a:rPr lang="en-US" dirty="0"/>
+              <a:t>: </a:t>
+            </a:r>
+            <a:r>
+              <a:rPr lang="en-US" dirty="0" smtClean="0"/>
+              <a:t>if equal, set value to </a:t>
+            </a:r>
+            <a:r>
+              <a:rPr lang="en-US" dirty="0">
+                <a:solidFill>
+                  <a:srgbClr val="FF0000"/>
+                </a:solidFill>
+              </a:rPr>
+              <a:t>NEW_VALUE</a:t>
+            </a:r>
+            <a:endParaRPr lang="en-US" dirty="0"/>
+          </a:p>
+          <a:p>
+            <a:pPr lvl="1"/>
+            <a:r>
+              <a:rPr lang="en-US" dirty="0" smtClean="0">
+                <a:solidFill>
+                  <a:srgbClr val="FF0000"/>
+                </a:solidFill>
+              </a:rPr>
+              <a:t>VALUE_QUERIED</a:t>
+            </a:r>
+            <a:r>
+              <a:rPr lang="en-US" dirty="0" smtClean="0"/>
+              <a:t>: if equal or not equal, get new value queried</a:t>
+            </a:r>
+          </a:p>
+          <a:p>
+            <a:r>
+              <a:rPr lang="en-US" dirty="0"/>
+              <a:t>See &lt;</a:t>
+            </a:r>
+            <a:r>
+              <a:rPr lang="en-US" dirty="0" err="1"/>
+              <a:t>c_zhtclient_lanl_threaded.c</a:t>
+            </a:r>
+            <a:r>
+              <a:rPr lang="en-US" dirty="0" smtClean="0"/>
+              <a:t>&gt; for example</a:t>
+            </a:r>
+          </a:p>
+          <a:p>
+            <a:pPr>
+              <a:lnSpc>
+                <a:spcPct val="100000"/>
+              </a:lnSpc>
+            </a:pPr>
+            <a:endParaRPr lang="en-US" dirty="0" smtClean="0"/>
+          </a:p>
+          <a:p>
+            <a:pPr lvl="1">
+              <a:buFont typeface="Wingdings 2" charset="2"/>
+              <a:buChar char=""/>
+            </a:pPr>
+            <a:endParaRPr lang="en-US" dirty="0"/>
+          </a:p>
+          <a:p>
+            <a:pPr lvl="1">
+              <a:buFont typeface="Wingdings 2" charset="2"/>
+              <a:buChar char=""/>
+            </a:pPr>
+            <a:endParaRPr lang="en-US" dirty="0" smtClean="0"/>
+          </a:p>
+          <a:p>
+            <a:pPr lvl="2"/>
+            <a:endParaRPr lang="en-US" dirty="0"/>
+          </a:p>
+          <a:p>
+            <a:pPr lvl="1"/>
+            <a:endParaRPr lang="en-US" dirty="0"/>
+          </a:p>
+        </p:txBody>
+      </p:sp>
+    </p:spTree>
+    <p:extLst>
+      <p:ext uri="{BB962C8B-B14F-4D97-AF65-F5344CB8AC3E}">
+        <p14:creationId xmlns:p14="http://schemas.microsoft.com/office/powerpoint/2010/main" val="2802576324"/>
+      </p:ext>
+    </p:extLst>
   </p:cSld>
   <p:clrMapOvr>
     <a:masterClrMapping/>
@@ -9720,6 +11656,543 @@
         <p14:creationId xmlns:p14="http://schemas.microsoft.com/office/powerpoint/2010/main" val="2244178298"/>
       </p:ext>
     </p:extLst>
+  </p:cSld>
+  <p:clrMapOvr>
+    <a:masterClrMapping/>
+  </p:clrMapOvr>
+  <p:timing>
+    <p:tnLst>
+      <p:par>
+        <p:cTn id="1" dur="indefinite" restart="never" nodeType="tmRoot"/>
+      </p:par>
+    </p:tnLst>
+  </p:timing>
+</p:sld>
+</file>
+
+<file path=ppt/slides/slide30.xml><?xml version="1.0" encoding="utf-8"?>
+<p:sld xmlns:a="http://schemas.openxmlformats.org/drawingml/2006/main" xmlns:r="http://schemas.openxmlformats.org/officeDocument/2006/relationships" xmlns:p="http://schemas.openxmlformats.org/presentationml/2006/main">
+  <p:cSld>
+    <p:spTree>
+      <p:nvGrpSpPr>
+        <p:cNvPr id="1" name=""/>
+        <p:cNvGrpSpPr/>
+        <p:nvPr/>
+      </p:nvGrpSpPr>
+      <p:grpSpPr>
+        <a:xfrm>
+          <a:off x="0" y="0"/>
+          <a:ext cx="0" cy="0"/>
+          <a:chOff x="0" y="0"/>
+          <a:chExt cx="0" cy="0"/>
+        </a:xfrm>
+      </p:grpSpPr>
+      <p:sp>
+        <p:nvSpPr>
+          <p:cNvPr id="2" name="Title 1"/>
+          <p:cNvSpPr>
+            <a:spLocks noGrp="1"/>
+          </p:cNvSpPr>
+          <p:nvPr>
+            <p:ph type="title"/>
+          </p:nvPr>
+        </p:nvSpPr>
+        <p:spPr>
+          <a:xfrm>
+            <a:off x="0" y="155448"/>
+            <a:ext cx="9144000" cy="1252728"/>
+          </a:xfrm>
+        </p:spPr>
+        <p:txBody>
+          <a:bodyPr>
+            <a:noAutofit/>
+          </a:bodyPr>
+          <a:lstStyle/>
+          <a:p>
+            <a:r>
+              <a:rPr lang="en-US" sz="4400" dirty="0" smtClean="0"/>
+              <a:t>How to </a:t>
+            </a:r>
+            <a:r>
+              <a:rPr lang="en-US" sz="4400" dirty="0" err="1" smtClean="0"/>
+              <a:t>dev</a:t>
+            </a:r>
+            <a:r>
+              <a:rPr lang="en-US" sz="4400" dirty="0" smtClean="0"/>
+              <a:t> your ZHT apps</a:t>
+            </a:r>
+            <a:endParaRPr lang="en-US" sz="3600" dirty="0"/>
+          </a:p>
+        </p:txBody>
+      </p:sp>
+      <p:sp>
+        <p:nvSpPr>
+          <p:cNvPr id="4" name="Slide Number Placeholder 3"/>
+          <p:cNvSpPr>
+            <a:spLocks noGrp="1"/>
+          </p:cNvSpPr>
+          <p:nvPr>
+            <p:ph type="sldNum" sz="quarter" idx="12"/>
+          </p:nvPr>
+        </p:nvSpPr>
+        <p:spPr/>
+        <p:txBody>
+          <a:bodyPr/>
+          <a:lstStyle/>
+          <a:p>
+            <a:fld id="{B6F15528-21DE-4FAA-801E-634DDDAF4B2B}" type="slidenum">
+              <a:rPr lang="en-US" smtClean="0"/>
+              <a:pPr/>
+              <a:t>30</a:t>
+            </a:fld>
+            <a:endParaRPr lang="en-US"/>
+          </a:p>
+        </p:txBody>
+      </p:sp>
+      <p:sp>
+        <p:nvSpPr>
+          <p:cNvPr id="3" name="Content Placeholder 2"/>
+          <p:cNvSpPr>
+            <a:spLocks noGrp="1"/>
+          </p:cNvSpPr>
+          <p:nvPr>
+            <p:ph idx="1"/>
+          </p:nvPr>
+        </p:nvSpPr>
+        <p:spPr>
+          <a:xfrm>
+            <a:off x="304800" y="1775191"/>
+            <a:ext cx="8229600" cy="4625609"/>
+          </a:xfrm>
+        </p:spPr>
+        <p:txBody>
+          <a:bodyPr>
+            <a:normAutofit/>
+          </a:bodyPr>
+          <a:lstStyle/>
+          <a:p>
+            <a:pPr marL="438912" lvl="1" indent="-320040">
+              <a:spcBef>
+                <a:spcPts val="0"/>
+              </a:spcBef>
+              <a:buClr>
+                <a:schemeClr val="accent1"/>
+              </a:buClr>
+              <a:buSzPct val="80000"/>
+              <a:buFont typeface="Wingdings 2"/>
+              <a:buChar char=""/>
+            </a:pPr>
+            <a:r>
+              <a:rPr lang="en-US" dirty="0" smtClean="0"/>
+              <a:t>Prototype by customizing ZHT</a:t>
+            </a:r>
+          </a:p>
+          <a:p>
+            <a:pPr marL="704088" lvl="2" indent="-320040">
+              <a:spcBef>
+                <a:spcPts val="0"/>
+              </a:spcBef>
+              <a:buClr>
+                <a:schemeClr val="accent1"/>
+              </a:buClr>
+              <a:buSzPct val="80000"/>
+              <a:buFont typeface="Wingdings 2"/>
+              <a:buChar char=""/>
+            </a:pPr>
+            <a:r>
+              <a:rPr lang="en-US" u="sng" dirty="0" smtClean="0">
+                <a:hlinkClick r:id="rId2"/>
+              </a:rPr>
+              <a:t>iit.cs550.pa1</a:t>
+            </a:r>
+          </a:p>
+          <a:p>
+            <a:pPr marL="923544" lvl="3" indent="-320040">
+              <a:spcBef>
+                <a:spcPts val="0"/>
+              </a:spcBef>
+              <a:buClr>
+                <a:schemeClr val="accent1"/>
+              </a:buClr>
+              <a:buSzPct val="80000"/>
+              <a:buFont typeface="Wingdings 2"/>
+              <a:buChar char=""/>
+            </a:pPr>
+            <a:r>
+              <a:rPr lang="en-US" dirty="0" smtClean="0">
+                <a:hlinkClick r:id="rId2"/>
+              </a:rPr>
+              <a:t>https</a:t>
+            </a:r>
+            <a:r>
+              <a:rPr lang="en-US" dirty="0">
+                <a:hlinkClick r:id="rId2"/>
+              </a:rPr>
+              <a:t>://bitbucket.org/xiaobingo/iit.cs550.pa1</a:t>
+            </a:r>
+            <a:endParaRPr lang="en-US" dirty="0" smtClean="0"/>
+          </a:p>
+          <a:p>
+            <a:pPr lvl="2"/>
+            <a:endParaRPr lang="en-US" dirty="0"/>
+          </a:p>
+          <a:p>
+            <a:pPr lvl="1"/>
+            <a:endParaRPr lang="en-US" dirty="0"/>
+          </a:p>
+        </p:txBody>
+      </p:sp>
+    </p:spTree>
+    <p:extLst>
+      <p:ext uri="{BB962C8B-B14F-4D97-AF65-F5344CB8AC3E}">
+        <p14:creationId xmlns:p14="http://schemas.microsoft.com/office/powerpoint/2010/main" val="1200828179"/>
+      </p:ext>
+    </p:extLst>
+  </p:cSld>
+  <p:clrMapOvr>
+    <a:masterClrMapping/>
+  </p:clrMapOvr>
+  <p:timing>
+    <p:tnLst>
+      <p:par>
+        <p:cTn id="1" dur="indefinite" restart="never" nodeType="tmRoot"/>
+      </p:par>
+    </p:tnLst>
+  </p:timing>
+</p:sld>
+</file>
+
+<file path=ppt/slides/slide31.xml><?xml version="1.0" encoding="utf-8"?>
+<p:sld xmlns:a="http://schemas.openxmlformats.org/drawingml/2006/main" xmlns:r="http://schemas.openxmlformats.org/officeDocument/2006/relationships" xmlns:p="http://schemas.openxmlformats.org/presentationml/2006/main">
+  <p:cSld>
+    <p:spTree>
+      <p:nvGrpSpPr>
+        <p:cNvPr id="1" name=""/>
+        <p:cNvGrpSpPr/>
+        <p:nvPr/>
+      </p:nvGrpSpPr>
+      <p:grpSpPr>
+        <a:xfrm>
+          <a:off x="0" y="0"/>
+          <a:ext cx="0" cy="0"/>
+          <a:chOff x="0" y="0"/>
+          <a:chExt cx="0" cy="0"/>
+        </a:xfrm>
+      </p:grpSpPr>
+      <p:sp>
+        <p:nvSpPr>
+          <p:cNvPr id="2" name="Title 1"/>
+          <p:cNvSpPr>
+            <a:spLocks noGrp="1"/>
+          </p:cNvSpPr>
+          <p:nvPr>
+            <p:ph type="title"/>
+          </p:nvPr>
+        </p:nvSpPr>
+        <p:spPr>
+          <a:xfrm>
+            <a:off x="0" y="155448"/>
+            <a:ext cx="9144000" cy="1252728"/>
+          </a:xfrm>
+        </p:spPr>
+        <p:txBody>
+          <a:bodyPr>
+            <a:noAutofit/>
+          </a:bodyPr>
+          <a:lstStyle/>
+          <a:p>
+            <a:r>
+              <a:rPr lang="en-US" sz="4400" dirty="0" smtClean="0"/>
+              <a:t>How to </a:t>
+            </a:r>
+            <a:r>
+              <a:rPr lang="en-US" sz="4400" dirty="0" err="1" smtClean="0"/>
+              <a:t>dev</a:t>
+            </a:r>
+            <a:r>
+              <a:rPr lang="en-US" sz="4400" dirty="0" smtClean="0"/>
+              <a:t> your ZHT apps</a:t>
+            </a:r>
+            <a:endParaRPr lang="en-US" sz="3600" dirty="0"/>
+          </a:p>
+        </p:txBody>
+      </p:sp>
+      <p:sp>
+        <p:nvSpPr>
+          <p:cNvPr id="4" name="Slide Number Placeholder 3"/>
+          <p:cNvSpPr>
+            <a:spLocks noGrp="1"/>
+          </p:cNvSpPr>
+          <p:nvPr>
+            <p:ph type="sldNum" sz="quarter" idx="12"/>
+          </p:nvPr>
+        </p:nvSpPr>
+        <p:spPr/>
+        <p:txBody>
+          <a:bodyPr/>
+          <a:lstStyle/>
+          <a:p>
+            <a:fld id="{B6F15528-21DE-4FAA-801E-634DDDAF4B2B}" type="slidenum">
+              <a:rPr lang="en-US" smtClean="0"/>
+              <a:pPr/>
+              <a:t>31</a:t>
+            </a:fld>
+            <a:endParaRPr lang="en-US"/>
+          </a:p>
+        </p:txBody>
+      </p:sp>
+      <p:sp>
+        <p:nvSpPr>
+          <p:cNvPr id="3" name="Content Placeholder 2"/>
+          <p:cNvSpPr>
+            <a:spLocks noGrp="1"/>
+          </p:cNvSpPr>
+          <p:nvPr>
+            <p:ph idx="1"/>
+          </p:nvPr>
+        </p:nvSpPr>
+        <p:spPr>
+          <a:xfrm>
+            <a:off x="304800" y="1775191"/>
+            <a:ext cx="8229600" cy="4625609"/>
+          </a:xfrm>
+        </p:spPr>
+        <p:txBody>
+          <a:bodyPr>
+            <a:normAutofit/>
+          </a:bodyPr>
+          <a:lstStyle/>
+          <a:p>
+            <a:pPr marL="438912" lvl="1" indent="-320040">
+              <a:spcBef>
+                <a:spcPts val="0"/>
+              </a:spcBef>
+              <a:buClr>
+                <a:schemeClr val="accent1"/>
+              </a:buClr>
+              <a:buSzPct val="80000"/>
+              <a:buFont typeface="Wingdings 2"/>
+              <a:buChar char=""/>
+            </a:pPr>
+            <a:r>
+              <a:rPr lang="en-US" dirty="0" smtClean="0"/>
+              <a:t>demo</a:t>
+            </a:r>
+          </a:p>
+          <a:p>
+            <a:pPr lvl="2"/>
+            <a:endParaRPr lang="en-US" dirty="0"/>
+          </a:p>
+          <a:p>
+            <a:pPr lvl="1"/>
+            <a:endParaRPr lang="en-US" dirty="0"/>
+          </a:p>
+        </p:txBody>
+      </p:sp>
+    </p:spTree>
+    <p:extLst>
+      <p:ext uri="{BB962C8B-B14F-4D97-AF65-F5344CB8AC3E}">
+        <p14:creationId xmlns:p14="http://schemas.microsoft.com/office/powerpoint/2010/main" val="473837933"/>
+      </p:ext>
+    </p:extLst>
+  </p:cSld>
+  <p:clrMapOvr>
+    <a:masterClrMapping/>
+  </p:clrMapOvr>
+  <p:timing>
+    <p:tnLst>
+      <p:par>
+        <p:cTn id="1" dur="indefinite" restart="never" nodeType="tmRoot"/>
+      </p:par>
+    </p:tnLst>
+  </p:timing>
+</p:sld>
+</file>
+
+<file path=ppt/slides/slide32.xml><?xml version="1.0" encoding="utf-8"?>
+<p:sld xmlns:a="http://schemas.openxmlformats.org/drawingml/2006/main" xmlns:r="http://schemas.openxmlformats.org/officeDocument/2006/relationships" xmlns:p="http://schemas.openxmlformats.org/presentationml/2006/main">
+  <p:cSld>
+    <p:spTree>
+      <p:nvGrpSpPr>
+        <p:cNvPr id="1" name=""/>
+        <p:cNvGrpSpPr/>
+        <p:nvPr/>
+      </p:nvGrpSpPr>
+      <p:grpSpPr>
+        <a:xfrm>
+          <a:off x="0" y="0"/>
+          <a:ext cx="0" cy="0"/>
+          <a:chOff x="0" y="0"/>
+          <a:chExt cx="0" cy="0"/>
+        </a:xfrm>
+      </p:grpSpPr>
+      <p:sp>
+        <p:nvSpPr>
+          <p:cNvPr id="2" name="Title 1"/>
+          <p:cNvSpPr>
+            <a:spLocks noGrp="1"/>
+          </p:cNvSpPr>
+          <p:nvPr>
+            <p:ph type="title"/>
+          </p:nvPr>
+        </p:nvSpPr>
+        <p:spPr/>
+        <p:txBody>
+          <a:bodyPr/>
+          <a:lstStyle/>
+          <a:p>
+            <a:endParaRPr lang="en-US" dirty="0"/>
+          </a:p>
+        </p:txBody>
+      </p:sp>
+      <p:sp>
+        <p:nvSpPr>
+          <p:cNvPr id="3" name="Content Placeholder 2"/>
+          <p:cNvSpPr>
+            <a:spLocks noGrp="1"/>
+          </p:cNvSpPr>
+          <p:nvPr>
+            <p:ph idx="1"/>
+          </p:nvPr>
+        </p:nvSpPr>
+        <p:spPr/>
+        <p:txBody>
+          <a:bodyPr>
+            <a:normAutofit/>
+          </a:bodyPr>
+          <a:lstStyle/>
+          <a:p>
+            <a:pPr algn="ctr">
+              <a:buNone/>
+            </a:pPr>
+            <a:endParaRPr lang="en-US" sz="8800" dirty="0" smtClean="0"/>
+          </a:p>
+          <a:p>
+            <a:pPr algn="ctr">
+              <a:buNone/>
+            </a:pPr>
+            <a:r>
+              <a:rPr lang="en-US" sz="8800" b="1" dirty="0" smtClean="0"/>
+              <a:t>Questions?</a:t>
+            </a:r>
+          </a:p>
+          <a:p>
+            <a:pPr algn="ctr">
+              <a:buNone/>
+            </a:pPr>
+            <a:r>
+              <a:rPr lang="en-US" sz="2000" b="1" dirty="0" err="1" smtClean="0"/>
+              <a:t>Tonglin</a:t>
+            </a:r>
+            <a:r>
+              <a:rPr lang="en-US" sz="2000" b="1" dirty="0" smtClean="0"/>
+              <a:t> Li, </a:t>
+            </a:r>
+            <a:r>
+              <a:rPr lang="en-US" sz="2000" b="1" dirty="0" err="1" smtClean="0"/>
+              <a:t>Xiaobing</a:t>
+            </a:r>
+            <a:r>
+              <a:rPr lang="en-US" sz="2000" b="1" dirty="0" smtClean="0"/>
+              <a:t> Zhou</a:t>
+            </a:r>
+          </a:p>
+          <a:p>
+            <a:pPr algn="ctr">
+              <a:buNone/>
+            </a:pPr>
+            <a:r>
+              <a:rPr lang="en-US" sz="2000" b="1" dirty="0" smtClean="0">
+                <a:hlinkClick r:id="rId3"/>
+              </a:rPr>
+              <a:t>tli13@hawk.iit.edu</a:t>
+            </a:r>
+            <a:r>
+              <a:rPr lang="en-US" sz="2000" b="1" dirty="0" smtClean="0"/>
+              <a:t>, </a:t>
+            </a:r>
+            <a:r>
+              <a:rPr lang="en-US" sz="2000" b="1" u="sng" dirty="0" smtClean="0">
+                <a:solidFill>
+                  <a:srgbClr val="0070C0"/>
+                </a:solidFill>
+                <a:hlinkClick r:id="rId4"/>
+              </a:rPr>
+              <a:t>xzhou40@hawk.iit.edu</a:t>
+            </a:r>
+            <a:endParaRPr lang="en-US" sz="2000" b="1" u="sng" dirty="0" smtClean="0">
+              <a:solidFill>
+                <a:srgbClr val="0070C0"/>
+              </a:solidFill>
+            </a:endParaRPr>
+          </a:p>
+          <a:p>
+            <a:pPr algn="ctr">
+              <a:buNone/>
+            </a:pPr>
+            <a:endParaRPr lang="en-US" sz="2000" b="1" u="sng" dirty="0" smtClean="0">
+              <a:solidFill>
+                <a:srgbClr val="0070C0"/>
+              </a:solidFill>
+            </a:endParaRPr>
+          </a:p>
+          <a:p>
+            <a:pPr algn="ctr">
+              <a:buNone/>
+            </a:pPr>
+            <a:r>
+              <a:rPr lang="en-US" sz="2000" dirty="0">
+                <a:hlinkClick r:id="rId5"/>
+              </a:rPr>
+              <a:t>http://datasys.cs.iit.edu/projects/ZHT</a:t>
+            </a:r>
+            <a:r>
+              <a:rPr lang="en-US" sz="2000" dirty="0" smtClean="0">
+                <a:hlinkClick r:id="rId5"/>
+              </a:rPr>
+              <a:t>/</a:t>
+            </a:r>
+            <a:endParaRPr lang="en-US" sz="2000" dirty="0" smtClean="0"/>
+          </a:p>
+          <a:p>
+            <a:pPr algn="ctr">
+              <a:buNone/>
+            </a:pPr>
+            <a:r>
+              <a:rPr lang="en-US" sz="2000" dirty="0">
+                <a:hlinkClick r:id="rId6"/>
+              </a:rPr>
+              <a:t>https://bitbucket.org/xiaobingo/iit.datasys.zht-mpi</a:t>
+            </a:r>
+            <a:endParaRPr lang="en-US" sz="2000" b="1" dirty="0"/>
+          </a:p>
+        </p:txBody>
+      </p:sp>
+      <p:sp>
+        <p:nvSpPr>
+          <p:cNvPr id="4" name="Slide Number Placeholder 3"/>
+          <p:cNvSpPr>
+            <a:spLocks noGrp="1"/>
+          </p:cNvSpPr>
+          <p:nvPr>
+            <p:ph type="sldNum" sz="quarter" idx="12"/>
+          </p:nvPr>
+        </p:nvSpPr>
+        <p:spPr/>
+        <p:txBody>
+          <a:bodyPr/>
+          <a:lstStyle/>
+          <a:p>
+            <a:fld id="{B6F15528-21DE-4FAA-801E-634DDDAF4B2B}" type="slidenum">
+              <a:rPr lang="en-US" smtClean="0"/>
+              <a:pPr/>
+              <a:t>32</a:t>
+            </a:fld>
+            <a:endParaRPr lang="en-US"/>
+          </a:p>
+        </p:txBody>
+      </p:sp>
+    </p:spTree>
   </p:cSld>
   <p:clrMapOvr>
     <a:masterClrMapping/>
@@ -10770,7 +13243,7 @@
         <p:spPr/>
         <p:txBody>
           <a:bodyPr>
-            <a:normAutofit lnSpcReduction="10000"/>
+            <a:normAutofit fontScale="92500"/>
           </a:bodyPr>
           <a:lstStyle/>
           <a:p>
@@ -10841,6 +13314,25 @@
                 <a:srgbClr val="FF0000"/>
               </a:solidFill>
             </a:endParaRPr>
+          </a:p>
+          <a:p>
+            <a:pPr lvl="1"/>
+            <a:r>
+              <a:rPr lang="en-US" dirty="0">
+                <a:solidFill>
+                  <a:srgbClr val="0070C0"/>
+                </a:solidFill>
+              </a:rPr>
+              <a:t>ZHT C </a:t>
+            </a:r>
+            <a:r>
+              <a:rPr lang="en-US" dirty="0" smtClean="0">
+                <a:solidFill>
+                  <a:srgbClr val="0070C0"/>
+                </a:solidFill>
+              </a:rPr>
+              <a:t>binding is built on top of C++ binding</a:t>
+            </a:r>
           </a:p>
           <a:p>
             <a:pPr lvl="1"/>

</xml_diff>